<commit_message>
zmeny v prezentaci a odstraneni
</commit_message>
<xml_diff>
--- a/advanced/Technické dovednosti v AI.pptx
+++ b/advanced/Technické dovednosti v AI.pptx
@@ -5,7 +5,7 @@
     <p:sldMasterId id="2147483648" r:id="rId1"/>
   </p:sldMasterIdLst>
   <p:notesMasterIdLst>
-    <p:notesMasterId r:id="rId20"/>
+    <p:notesMasterId r:id="rId23"/>
   </p:notesMasterIdLst>
   <p:sldIdLst>
     <p:sldId id="256" r:id="rId2"/>
@@ -23,9 +23,12 @@
     <p:sldId id="347" r:id="rId14"/>
     <p:sldId id="257" r:id="rId15"/>
     <p:sldId id="259" r:id="rId16"/>
-    <p:sldId id="261" r:id="rId17"/>
-    <p:sldId id="346" r:id="rId18"/>
-    <p:sldId id="345" r:id="rId19"/>
+    <p:sldId id="266" r:id="rId17"/>
+    <p:sldId id="278" r:id="rId18"/>
+    <p:sldId id="271" r:id="rId19"/>
+    <p:sldId id="261" r:id="rId20"/>
+    <p:sldId id="346" r:id="rId21"/>
+    <p:sldId id="345" r:id="rId22"/>
   </p:sldIdLst>
   <p:sldSz cx="12192000" cy="6858000"/>
   <p:notesSz cx="6858000" cy="9144000"/>
@@ -135,7 +138,8 @@
 <file path=ppt/revisionInfo.xml><?xml version="1.0" encoding="utf-8"?>
 <p1510:revInfo xmlns:a="http://schemas.openxmlformats.org/drawingml/2006/main" xmlns:r="http://schemas.openxmlformats.org/officeDocument/2006/relationships" xmlns:p1510="http://schemas.microsoft.com/office/powerpoint/2015/10/main">
   <p1510:revLst>
-    <p1510:client id="{5A9CEDE8-F954-421E-BEE7-D92F3EE07AEC}" v="1" dt="2024-10-12T06:47:57.446"/>
+    <p1510:client id="{121F4F25-45C8-4635-942E-C714780CFE95}" v="43" dt="2024-10-12T08:15:23.876"/>
+    <p1510:client id="{5A9CEDE8-F954-421E-BEE7-D92F3EE07AEC}" v="73" dt="2024-10-12T08:32:03.975"/>
   </p1510:revLst>
 </p1510:revInfo>
 </file>
@@ -145,10 +149,168 @@
   <pc:docChgLst>
     <pc:chgData name="Vasinek Michal" userId="59c221ac-7878-4946-89e4-16d0fc1b4efd" providerId="ADAL" clId="{5A9CEDE8-F954-421E-BEE7-D92F3EE07AEC}"/>
     <pc:docChg chg="undo custSel addSld modSld">
-      <pc:chgData name="Vasinek Michal" userId="59c221ac-7878-4946-89e4-16d0fc1b4efd" providerId="ADAL" clId="{5A9CEDE8-F954-421E-BEE7-D92F3EE07AEC}" dt="2024-10-12T06:47:57.446" v="66"/>
+      <pc:chgData name="Vasinek Michal" userId="59c221ac-7878-4946-89e4-16d0fc1b4efd" providerId="ADAL" clId="{5A9CEDE8-F954-421E-BEE7-D92F3EE07AEC}" dt="2024-10-12T08:56:39.068" v="139" actId="20577"/>
       <pc:docMkLst>
         <pc:docMk/>
       </pc:docMkLst>
+      <pc:sldChg chg="modSp mod">
+        <pc:chgData name="Vasinek Michal" userId="59c221ac-7878-4946-89e4-16d0fc1b4efd" providerId="ADAL" clId="{5A9CEDE8-F954-421E-BEE7-D92F3EE07AEC}" dt="2024-10-12T08:56:39.068" v="139" actId="20577"/>
+        <pc:sldMkLst>
+          <pc:docMk/>
+          <pc:sldMk cId="2497993548" sldId="256"/>
+        </pc:sldMkLst>
+        <pc:spChg chg="mod">
+          <ac:chgData name="Vasinek Michal" userId="59c221ac-7878-4946-89e4-16d0fc1b4efd" providerId="ADAL" clId="{5A9CEDE8-F954-421E-BEE7-D92F3EE07AEC}" dt="2024-10-12T08:56:39.068" v="139" actId="20577"/>
+          <ac:spMkLst>
+            <pc:docMk/>
+            <pc:sldMk cId="2497993548" sldId="256"/>
+            <ac:spMk id="3" creationId="{CEAB410E-CA59-A0FE-CA31-30FA2206D115}"/>
+          </ac:spMkLst>
+        </pc:spChg>
+      </pc:sldChg>
+      <pc:sldChg chg="addSp delSp modSp add mod setBg delDesignElem">
+        <pc:chgData name="Vasinek Michal" userId="59c221ac-7878-4946-89e4-16d0fc1b4efd" providerId="ADAL" clId="{5A9CEDE8-F954-421E-BEE7-D92F3EE07AEC}" dt="2024-10-12T08:32:03.975" v="138" actId="20577"/>
+        <pc:sldMkLst>
+          <pc:docMk/>
+          <pc:sldMk cId="871494376" sldId="266"/>
+        </pc:sldMkLst>
+        <pc:spChg chg="mod">
+          <ac:chgData name="Vasinek Michal" userId="59c221ac-7878-4946-89e4-16d0fc1b4efd" providerId="ADAL" clId="{5A9CEDE8-F954-421E-BEE7-D92F3EE07AEC}" dt="2024-10-12T08:32:03.975" v="138" actId="20577"/>
+          <ac:spMkLst>
+            <pc:docMk/>
+            <pc:sldMk cId="871494376" sldId="266"/>
+            <ac:spMk id="2" creationId="{FDEEECC2-6B48-8771-0B28-840D7F6B5EB3}"/>
+          </ac:spMkLst>
+        </pc:spChg>
+        <pc:spChg chg="del">
+          <ac:chgData name="Vasinek Michal" userId="59c221ac-7878-4946-89e4-16d0fc1b4efd" providerId="ADAL" clId="{5A9CEDE8-F954-421E-BEE7-D92F3EE07AEC}" dt="2024-10-12T08:26:28.858" v="70"/>
+          <ac:spMkLst>
+            <pc:docMk/>
+            <pc:sldMk cId="871494376" sldId="266"/>
+            <ac:spMk id="22" creationId="{4DA718D0-4865-4629-8134-44F68D41D574}"/>
+          </ac:spMkLst>
+        </pc:spChg>
+        <pc:spChg chg="del">
+          <ac:chgData name="Vasinek Michal" userId="59c221ac-7878-4946-89e4-16d0fc1b4efd" providerId="ADAL" clId="{5A9CEDE8-F954-421E-BEE7-D92F3EE07AEC}" dt="2024-10-12T08:26:28.858" v="70"/>
+          <ac:spMkLst>
+            <pc:docMk/>
+            <pc:sldMk cId="871494376" sldId="266"/>
+            <ac:spMk id="40" creationId="{CBC4F608-B4B8-48C3-9572-C0F061B1CD99}"/>
+          </ac:spMkLst>
+        </pc:spChg>
+        <pc:spChg chg="mod">
+          <ac:chgData name="Vasinek Michal" userId="59c221ac-7878-4946-89e4-16d0fc1b4efd" providerId="ADAL" clId="{5A9CEDE8-F954-421E-BEE7-D92F3EE07AEC}" dt="2024-10-12T08:27:53.692" v="115" actId="26606"/>
+          <ac:spMkLst>
+            <pc:docMk/>
+            <pc:sldMk cId="871494376" sldId="266"/>
+            <ac:spMk id="41" creationId="{EDCAE6CD-06AF-F93A-84E4-F21E685F17C9}"/>
+          </ac:spMkLst>
+        </pc:spChg>
+        <pc:spChg chg="add del">
+          <ac:chgData name="Vasinek Michal" userId="59c221ac-7878-4946-89e4-16d0fc1b4efd" providerId="ADAL" clId="{5A9CEDE8-F954-421E-BEE7-D92F3EE07AEC}" dt="2024-10-12T08:27:25.298" v="109" actId="26606"/>
+          <ac:spMkLst>
+            <pc:docMk/>
+            <pc:sldMk cId="871494376" sldId="266"/>
+            <ac:spMk id="46" creationId="{CBB2B1F0-0DD6-4744-9A46-7A344FB48E40}"/>
+          </ac:spMkLst>
+        </pc:spChg>
+        <pc:spChg chg="add del">
+          <ac:chgData name="Vasinek Michal" userId="59c221ac-7878-4946-89e4-16d0fc1b4efd" providerId="ADAL" clId="{5A9CEDE8-F954-421E-BEE7-D92F3EE07AEC}" dt="2024-10-12T08:27:25.298" v="109" actId="26606"/>
+          <ac:spMkLst>
+            <pc:docMk/>
+            <pc:sldMk cId="871494376" sldId="266"/>
+            <ac:spMk id="48" creationId="{52D502E5-F6B4-4D58-B4AE-FC466FF15EE8}"/>
+          </ac:spMkLst>
+        </pc:spChg>
+        <pc:spChg chg="add del">
+          <ac:chgData name="Vasinek Michal" userId="59c221ac-7878-4946-89e4-16d0fc1b4efd" providerId="ADAL" clId="{5A9CEDE8-F954-421E-BEE7-D92F3EE07AEC}" dt="2024-10-12T08:27:25.298" v="109" actId="26606"/>
+          <ac:spMkLst>
+            <pc:docMk/>
+            <pc:sldMk cId="871494376" sldId="266"/>
+            <ac:spMk id="50" creationId="{9DECDBF4-02B6-4BB4-B65B-B8107AD6A9E8}"/>
+          </ac:spMkLst>
+        </pc:spChg>
+        <pc:spChg chg="add del">
+          <ac:chgData name="Vasinek Michal" userId="59c221ac-7878-4946-89e4-16d0fc1b4efd" providerId="ADAL" clId="{5A9CEDE8-F954-421E-BEE7-D92F3EE07AEC}" dt="2024-10-12T08:27:26.896" v="111" actId="26606"/>
+          <ac:spMkLst>
+            <pc:docMk/>
+            <pc:sldMk cId="871494376" sldId="266"/>
+            <ac:spMk id="52" creationId="{E777E57D-6A88-4B5B-A068-2BA7FF4E8CCA}"/>
+          </ac:spMkLst>
+        </pc:spChg>
+        <pc:spChg chg="add del">
+          <ac:chgData name="Vasinek Michal" userId="59c221ac-7878-4946-89e4-16d0fc1b4efd" providerId="ADAL" clId="{5A9CEDE8-F954-421E-BEE7-D92F3EE07AEC}" dt="2024-10-12T08:27:26.896" v="111" actId="26606"/>
+          <ac:spMkLst>
+            <pc:docMk/>
+            <pc:sldMk cId="871494376" sldId="266"/>
+            <ac:spMk id="53" creationId="{F7117410-A2A4-4085-9ADC-46744551DBDE}"/>
+          </ac:spMkLst>
+        </pc:spChg>
+        <pc:spChg chg="add del">
+          <ac:chgData name="Vasinek Michal" userId="59c221ac-7878-4946-89e4-16d0fc1b4efd" providerId="ADAL" clId="{5A9CEDE8-F954-421E-BEE7-D92F3EE07AEC}" dt="2024-10-12T08:27:26.896" v="111" actId="26606"/>
+          <ac:spMkLst>
+            <pc:docMk/>
+            <pc:sldMk cId="871494376" sldId="266"/>
+            <ac:spMk id="54" creationId="{99F74EB5-E547-4FB4-95F5-BCC788F3C4A0}"/>
+          </ac:spMkLst>
+        </pc:spChg>
+        <pc:spChg chg="add del">
+          <ac:chgData name="Vasinek Michal" userId="59c221ac-7878-4946-89e4-16d0fc1b4efd" providerId="ADAL" clId="{5A9CEDE8-F954-421E-BEE7-D92F3EE07AEC}" dt="2024-10-12T08:27:53.692" v="115" actId="26606"/>
+          <ac:spMkLst>
+            <pc:docMk/>
+            <pc:sldMk cId="871494376" sldId="266"/>
+            <ac:spMk id="56" creationId="{CBB2B1F0-0DD6-4744-9A46-7A344FB48E40}"/>
+          </ac:spMkLst>
+        </pc:spChg>
+        <pc:spChg chg="add del">
+          <ac:chgData name="Vasinek Michal" userId="59c221ac-7878-4946-89e4-16d0fc1b4efd" providerId="ADAL" clId="{5A9CEDE8-F954-421E-BEE7-D92F3EE07AEC}" dt="2024-10-12T08:27:53.692" v="115" actId="26606"/>
+          <ac:spMkLst>
+            <pc:docMk/>
+            <pc:sldMk cId="871494376" sldId="266"/>
+            <ac:spMk id="57" creationId="{52D502E5-F6B4-4D58-B4AE-FC466FF15EE8}"/>
+          </ac:spMkLst>
+        </pc:spChg>
+        <pc:spChg chg="add del">
+          <ac:chgData name="Vasinek Michal" userId="59c221ac-7878-4946-89e4-16d0fc1b4efd" providerId="ADAL" clId="{5A9CEDE8-F954-421E-BEE7-D92F3EE07AEC}" dt="2024-10-12T08:27:53.692" v="115" actId="26606"/>
+          <ac:spMkLst>
+            <pc:docMk/>
+            <pc:sldMk cId="871494376" sldId="266"/>
+            <ac:spMk id="58" creationId="{9DECDBF4-02B6-4BB4-B65B-B8107AD6A9E8}"/>
+          </ac:spMkLst>
+        </pc:spChg>
+        <pc:spChg chg="add">
+          <ac:chgData name="Vasinek Michal" userId="59c221ac-7878-4946-89e4-16d0fc1b4efd" providerId="ADAL" clId="{5A9CEDE8-F954-421E-BEE7-D92F3EE07AEC}" dt="2024-10-12T08:27:53.692" v="115" actId="26606"/>
+          <ac:spMkLst>
+            <pc:docMk/>
+            <pc:sldMk cId="871494376" sldId="266"/>
+            <ac:spMk id="63" creationId="{CBB2B1F0-0DD6-4744-9A46-7A344FB48E40}"/>
+          </ac:spMkLst>
+        </pc:spChg>
+        <pc:spChg chg="add">
+          <ac:chgData name="Vasinek Michal" userId="59c221ac-7878-4946-89e4-16d0fc1b4efd" providerId="ADAL" clId="{5A9CEDE8-F954-421E-BEE7-D92F3EE07AEC}" dt="2024-10-12T08:27:53.692" v="115" actId="26606"/>
+          <ac:spMkLst>
+            <pc:docMk/>
+            <pc:sldMk cId="871494376" sldId="266"/>
+            <ac:spMk id="65" creationId="{52D502E5-F6B4-4D58-B4AE-FC466FF15EE8}"/>
+          </ac:spMkLst>
+        </pc:spChg>
+        <pc:spChg chg="add">
+          <ac:chgData name="Vasinek Michal" userId="59c221ac-7878-4946-89e4-16d0fc1b4efd" providerId="ADAL" clId="{5A9CEDE8-F954-421E-BEE7-D92F3EE07AEC}" dt="2024-10-12T08:27:53.692" v="115" actId="26606"/>
+          <ac:spMkLst>
+            <pc:docMk/>
+            <pc:sldMk cId="871494376" sldId="266"/>
+            <ac:spMk id="67" creationId="{9DECDBF4-02B6-4BB4-B65B-B8107AD6A9E8}"/>
+          </ac:spMkLst>
+        </pc:spChg>
+        <pc:grpChg chg="del">
+          <ac:chgData name="Vasinek Michal" userId="59c221ac-7878-4946-89e4-16d0fc1b4efd" providerId="ADAL" clId="{5A9CEDE8-F954-421E-BEE7-D92F3EE07AEC}" dt="2024-10-12T08:26:28.858" v="70"/>
+          <ac:grpSpMkLst>
+            <pc:docMk/>
+            <pc:sldMk cId="871494376" sldId="266"/>
+            <ac:grpSpMk id="24" creationId="{65167ED7-6315-43AB-B1B6-C326D5FD8F84}"/>
+          </ac:grpSpMkLst>
+        </pc:grpChg>
+      </pc:sldChg>
       <pc:sldChg chg="modSp">
         <pc:chgData name="Vasinek Michal" userId="59c221ac-7878-4946-89e4-16d0fc1b4efd" providerId="ADAL" clId="{5A9CEDE8-F954-421E-BEE7-D92F3EE07AEC}" dt="2024-10-12T06:47:57.446" v="66"/>
         <pc:sldMkLst>
@@ -163,6 +325,211 @@
             <ac:picMk id="10" creationId="{A45C4277-82DE-4675-8096-138D05478B49}"/>
           </ac:picMkLst>
         </pc:picChg>
+      </pc:sldChg>
+      <pc:sldChg chg="addSp delSp modSp add mod setBg delDesignElem">
+        <pc:chgData name="Vasinek Michal" userId="59c221ac-7878-4946-89e4-16d0fc1b4efd" providerId="ADAL" clId="{5A9CEDE8-F954-421E-BEE7-D92F3EE07AEC}" dt="2024-10-12T08:28:22.841" v="117" actId="26606"/>
+        <pc:sldMkLst>
+          <pc:docMk/>
+          <pc:sldMk cId="1287356245" sldId="271"/>
+        </pc:sldMkLst>
+        <pc:spChg chg="mod">
+          <ac:chgData name="Vasinek Michal" userId="59c221ac-7878-4946-89e4-16d0fc1b4efd" providerId="ADAL" clId="{5A9CEDE8-F954-421E-BEE7-D92F3EE07AEC}" dt="2024-10-12T08:28:22.841" v="117" actId="26606"/>
+          <ac:spMkLst>
+            <pc:docMk/>
+            <pc:sldMk cId="1287356245" sldId="271"/>
+            <ac:spMk id="2" creationId="{7063A2BA-8A70-D43B-3D5A-4BFEEB414568}"/>
+          </ac:spMkLst>
+        </pc:spChg>
+        <pc:spChg chg="mod">
+          <ac:chgData name="Vasinek Michal" userId="59c221ac-7878-4946-89e4-16d0fc1b4efd" providerId="ADAL" clId="{5A9CEDE8-F954-421E-BEE7-D92F3EE07AEC}" dt="2024-10-12T08:28:22.841" v="117" actId="26606"/>
+          <ac:spMkLst>
+            <pc:docMk/>
+            <pc:sldMk cId="1287356245" sldId="271"/>
+            <ac:spMk id="3" creationId="{B92A4BCA-3B7D-3E14-DBA9-EF81AEC07A35}"/>
+          </ac:spMkLst>
+        </pc:spChg>
+        <pc:spChg chg="add">
+          <ac:chgData name="Vasinek Michal" userId="59c221ac-7878-4946-89e4-16d0fc1b4efd" providerId="ADAL" clId="{5A9CEDE8-F954-421E-BEE7-D92F3EE07AEC}" dt="2024-10-12T08:28:22.841" v="117" actId="26606"/>
+          <ac:spMkLst>
+            <pc:docMk/>
+            <pc:sldMk cId="1287356245" sldId="271"/>
+            <ac:spMk id="5" creationId="{CBB2B1F0-0DD6-4744-9A46-7A344FB48E40}"/>
+          </ac:spMkLst>
+        </pc:spChg>
+        <pc:spChg chg="add">
+          <ac:chgData name="Vasinek Michal" userId="59c221ac-7878-4946-89e4-16d0fc1b4efd" providerId="ADAL" clId="{5A9CEDE8-F954-421E-BEE7-D92F3EE07AEC}" dt="2024-10-12T08:28:22.841" v="117" actId="26606"/>
+          <ac:spMkLst>
+            <pc:docMk/>
+            <pc:sldMk cId="1287356245" sldId="271"/>
+            <ac:spMk id="6" creationId="{52D502E5-F6B4-4D58-B4AE-FC466FF15EE8}"/>
+          </ac:spMkLst>
+        </pc:spChg>
+        <pc:spChg chg="del">
+          <ac:chgData name="Vasinek Michal" userId="59c221ac-7878-4946-89e4-16d0fc1b4efd" providerId="ADAL" clId="{5A9CEDE8-F954-421E-BEE7-D92F3EE07AEC}" dt="2024-10-12T08:26:28.858" v="70"/>
+          <ac:spMkLst>
+            <pc:docMk/>
+            <pc:sldMk cId="1287356245" sldId="271"/>
+            <ac:spMk id="8" creationId="{B6CDA21F-E7AF-4C75-8395-33F58D5B0E45}"/>
+          </ac:spMkLst>
+        </pc:spChg>
+        <pc:spChg chg="add">
+          <ac:chgData name="Vasinek Michal" userId="59c221ac-7878-4946-89e4-16d0fc1b4efd" providerId="ADAL" clId="{5A9CEDE8-F954-421E-BEE7-D92F3EE07AEC}" dt="2024-10-12T08:28:22.841" v="117" actId="26606"/>
+          <ac:spMkLst>
+            <pc:docMk/>
+            <pc:sldMk cId="1287356245" sldId="271"/>
+            <ac:spMk id="12" creationId="{9DECDBF4-02B6-4BB4-B65B-B8107AD6A9E8}"/>
+          </ac:spMkLst>
+        </pc:spChg>
+        <pc:spChg chg="del">
+          <ac:chgData name="Vasinek Michal" userId="59c221ac-7878-4946-89e4-16d0fc1b4efd" providerId="ADAL" clId="{5A9CEDE8-F954-421E-BEE7-D92F3EE07AEC}" dt="2024-10-12T08:26:28.858" v="70"/>
+          <ac:spMkLst>
+            <pc:docMk/>
+            <pc:sldMk cId="1287356245" sldId="271"/>
+            <ac:spMk id="15" creationId="{D5B0017B-2ECA-49AF-B397-DC140825DF8D}"/>
+          </ac:spMkLst>
+        </pc:spChg>
+        <pc:grpChg chg="del">
+          <ac:chgData name="Vasinek Michal" userId="59c221ac-7878-4946-89e4-16d0fc1b4efd" providerId="ADAL" clId="{5A9CEDE8-F954-421E-BEE7-D92F3EE07AEC}" dt="2024-10-12T08:26:28.858" v="70"/>
+          <ac:grpSpMkLst>
+            <pc:docMk/>
+            <pc:sldMk cId="1287356245" sldId="271"/>
+            <ac:grpSpMk id="10" creationId="{AE1C45F0-260A-458C-96ED-C1F6D2151219}"/>
+          </ac:grpSpMkLst>
+        </pc:grpChg>
+        <pc:cxnChg chg="del">
+          <ac:chgData name="Vasinek Michal" userId="59c221ac-7878-4946-89e4-16d0fc1b4efd" providerId="ADAL" clId="{5A9CEDE8-F954-421E-BEE7-D92F3EE07AEC}" dt="2024-10-12T08:26:28.858" v="70"/>
+          <ac:cxnSpMkLst>
+            <pc:docMk/>
+            <pc:sldMk cId="1287356245" sldId="271"/>
+            <ac:cxnSpMk id="17" creationId="{6CF1BAF6-AD41-4082-B212-8A1F9A2E8779}"/>
+          </ac:cxnSpMkLst>
+        </pc:cxnChg>
+      </pc:sldChg>
+      <pc:sldChg chg="addSp delSp modSp add mod setBg delDesignElem">
+        <pc:chgData name="Vasinek Michal" userId="59c221ac-7878-4946-89e4-16d0fc1b4efd" providerId="ADAL" clId="{5A9CEDE8-F954-421E-BEE7-D92F3EE07AEC}" dt="2024-10-12T08:28:09.045" v="116" actId="26606"/>
+        <pc:sldMkLst>
+          <pc:docMk/>
+          <pc:sldMk cId="778866854" sldId="278"/>
+        </pc:sldMkLst>
+        <pc:spChg chg="mod">
+          <ac:chgData name="Vasinek Michal" userId="59c221ac-7878-4946-89e4-16d0fc1b4efd" providerId="ADAL" clId="{5A9CEDE8-F954-421E-BEE7-D92F3EE07AEC}" dt="2024-10-12T08:28:09.045" v="116" actId="26606"/>
+          <ac:spMkLst>
+            <pc:docMk/>
+            <pc:sldMk cId="778866854" sldId="278"/>
+            <ac:spMk id="2" creationId="{37FBB45F-54F0-BBB0-8E06-9ECD9F426B81}"/>
+          </ac:spMkLst>
+        </pc:spChg>
+        <pc:spChg chg="mod">
+          <ac:chgData name="Vasinek Michal" userId="59c221ac-7878-4946-89e4-16d0fc1b4efd" providerId="ADAL" clId="{5A9CEDE8-F954-421E-BEE7-D92F3EE07AEC}" dt="2024-10-12T08:28:09.045" v="116" actId="26606"/>
+          <ac:spMkLst>
+            <pc:docMk/>
+            <pc:sldMk cId="778866854" sldId="278"/>
+            <ac:spMk id="3" creationId="{351AB4D8-A324-5713-6827-001D8F716EB8}"/>
+          </ac:spMkLst>
+        </pc:spChg>
+        <pc:spChg chg="add">
+          <ac:chgData name="Vasinek Michal" userId="59c221ac-7878-4946-89e4-16d0fc1b4efd" providerId="ADAL" clId="{5A9CEDE8-F954-421E-BEE7-D92F3EE07AEC}" dt="2024-10-12T08:28:09.045" v="116" actId="26606"/>
+          <ac:spMkLst>
+            <pc:docMk/>
+            <pc:sldMk cId="778866854" sldId="278"/>
+            <ac:spMk id="5" creationId="{CBB2B1F0-0DD6-4744-9A46-7A344FB48E40}"/>
+          </ac:spMkLst>
+        </pc:spChg>
+        <pc:spChg chg="add">
+          <ac:chgData name="Vasinek Michal" userId="59c221ac-7878-4946-89e4-16d0fc1b4efd" providerId="ADAL" clId="{5A9CEDE8-F954-421E-BEE7-D92F3EE07AEC}" dt="2024-10-12T08:28:09.045" v="116" actId="26606"/>
+          <ac:spMkLst>
+            <pc:docMk/>
+            <pc:sldMk cId="778866854" sldId="278"/>
+            <ac:spMk id="6" creationId="{52D502E5-F6B4-4D58-B4AE-FC466FF15EE8}"/>
+          </ac:spMkLst>
+        </pc:spChg>
+        <pc:spChg chg="del">
+          <ac:chgData name="Vasinek Michal" userId="59c221ac-7878-4946-89e4-16d0fc1b4efd" providerId="ADAL" clId="{5A9CEDE8-F954-421E-BEE7-D92F3EE07AEC}" dt="2024-10-12T08:26:28.858" v="70"/>
+          <ac:spMkLst>
+            <pc:docMk/>
+            <pc:sldMk cId="778866854" sldId="278"/>
+            <ac:spMk id="8" creationId="{B6CDA21F-E7AF-4C75-8395-33F58D5B0E45}"/>
+          </ac:spMkLst>
+        </pc:spChg>
+        <pc:spChg chg="add">
+          <ac:chgData name="Vasinek Michal" userId="59c221ac-7878-4946-89e4-16d0fc1b4efd" providerId="ADAL" clId="{5A9CEDE8-F954-421E-BEE7-D92F3EE07AEC}" dt="2024-10-12T08:28:09.045" v="116" actId="26606"/>
+          <ac:spMkLst>
+            <pc:docMk/>
+            <pc:sldMk cId="778866854" sldId="278"/>
+            <ac:spMk id="12" creationId="{9DECDBF4-02B6-4BB4-B65B-B8107AD6A9E8}"/>
+          </ac:spMkLst>
+        </pc:spChg>
+        <pc:spChg chg="del">
+          <ac:chgData name="Vasinek Michal" userId="59c221ac-7878-4946-89e4-16d0fc1b4efd" providerId="ADAL" clId="{5A9CEDE8-F954-421E-BEE7-D92F3EE07AEC}" dt="2024-10-12T08:26:28.858" v="70"/>
+          <ac:spMkLst>
+            <pc:docMk/>
+            <pc:sldMk cId="778866854" sldId="278"/>
+            <ac:spMk id="15" creationId="{D5B0017B-2ECA-49AF-B397-DC140825DF8D}"/>
+          </ac:spMkLst>
+        </pc:spChg>
+        <pc:grpChg chg="del">
+          <ac:chgData name="Vasinek Michal" userId="59c221ac-7878-4946-89e4-16d0fc1b4efd" providerId="ADAL" clId="{5A9CEDE8-F954-421E-BEE7-D92F3EE07AEC}" dt="2024-10-12T08:26:28.858" v="70"/>
+          <ac:grpSpMkLst>
+            <pc:docMk/>
+            <pc:sldMk cId="778866854" sldId="278"/>
+            <ac:grpSpMk id="10" creationId="{AE1C45F0-260A-458C-96ED-C1F6D2151219}"/>
+          </ac:grpSpMkLst>
+        </pc:grpChg>
+        <pc:cxnChg chg="del">
+          <ac:chgData name="Vasinek Michal" userId="59c221ac-7878-4946-89e4-16d0fc1b4efd" providerId="ADAL" clId="{5A9CEDE8-F954-421E-BEE7-D92F3EE07AEC}" dt="2024-10-12T08:26:28.858" v="70"/>
+          <ac:cxnSpMkLst>
+            <pc:docMk/>
+            <pc:sldMk cId="778866854" sldId="278"/>
+            <ac:cxnSpMk id="17" creationId="{6CF1BAF6-AD41-4082-B212-8A1F9A2E8779}"/>
+          </ac:cxnSpMkLst>
+        </pc:cxnChg>
+      </pc:sldChg>
+      <pc:sldChg chg="addSp modSp mod setBg">
+        <pc:chgData name="Vasinek Michal" userId="59c221ac-7878-4946-89e4-16d0fc1b4efd" providerId="ADAL" clId="{5A9CEDE8-F954-421E-BEE7-D92F3EE07AEC}" dt="2024-10-12T08:28:56.164" v="118" actId="26606"/>
+        <pc:sldMkLst>
+          <pc:docMk/>
+          <pc:sldMk cId="1021013197" sldId="346"/>
+        </pc:sldMkLst>
+        <pc:spChg chg="mod">
+          <ac:chgData name="Vasinek Michal" userId="59c221ac-7878-4946-89e4-16d0fc1b4efd" providerId="ADAL" clId="{5A9CEDE8-F954-421E-BEE7-D92F3EE07AEC}" dt="2024-10-12T08:28:56.164" v="118" actId="26606"/>
+          <ac:spMkLst>
+            <pc:docMk/>
+            <pc:sldMk cId="1021013197" sldId="346"/>
+            <ac:spMk id="2" creationId="{84EE1761-B830-83A2-0811-861B4773D319}"/>
+          </ac:spMkLst>
+        </pc:spChg>
+        <pc:spChg chg="mod">
+          <ac:chgData name="Vasinek Michal" userId="59c221ac-7878-4946-89e4-16d0fc1b4efd" providerId="ADAL" clId="{5A9CEDE8-F954-421E-BEE7-D92F3EE07AEC}" dt="2024-10-12T08:28:56.164" v="118" actId="26606"/>
+          <ac:spMkLst>
+            <pc:docMk/>
+            <pc:sldMk cId="1021013197" sldId="346"/>
+            <ac:spMk id="3" creationId="{582472B6-7558-3B1A-A38B-6C69389ABBD9}"/>
+          </ac:spMkLst>
+        </pc:spChg>
+        <pc:spChg chg="add">
+          <ac:chgData name="Vasinek Michal" userId="59c221ac-7878-4946-89e4-16d0fc1b4efd" providerId="ADAL" clId="{5A9CEDE8-F954-421E-BEE7-D92F3EE07AEC}" dt="2024-10-12T08:28:56.164" v="118" actId="26606"/>
+          <ac:spMkLst>
+            <pc:docMk/>
+            <pc:sldMk cId="1021013197" sldId="346"/>
+            <ac:spMk id="8" creationId="{CBB2B1F0-0DD6-4744-9A46-7A344FB48E40}"/>
+          </ac:spMkLst>
+        </pc:spChg>
+        <pc:spChg chg="add">
+          <ac:chgData name="Vasinek Michal" userId="59c221ac-7878-4946-89e4-16d0fc1b4efd" providerId="ADAL" clId="{5A9CEDE8-F954-421E-BEE7-D92F3EE07AEC}" dt="2024-10-12T08:28:56.164" v="118" actId="26606"/>
+          <ac:spMkLst>
+            <pc:docMk/>
+            <pc:sldMk cId="1021013197" sldId="346"/>
+            <ac:spMk id="10" creationId="{52D502E5-F6B4-4D58-B4AE-FC466FF15EE8}"/>
+          </ac:spMkLst>
+        </pc:spChg>
+        <pc:spChg chg="add">
+          <ac:chgData name="Vasinek Michal" userId="59c221ac-7878-4946-89e4-16d0fc1b4efd" providerId="ADAL" clId="{5A9CEDE8-F954-421E-BEE7-D92F3EE07AEC}" dt="2024-10-12T08:28:56.164" v="118" actId="26606"/>
+          <ac:spMkLst>
+            <pc:docMk/>
+            <pc:sldMk cId="1021013197" sldId="346"/>
+            <ac:spMk id="12" creationId="{9DECDBF4-02B6-4BB4-B65B-B8107AD6A9E8}"/>
+          </ac:spMkLst>
+        </pc:spChg>
       </pc:sldChg>
       <pc:sldChg chg="addSp delSp modSp new mod setBg addAnim">
         <pc:chgData name="Vasinek Michal" userId="59c221ac-7878-4946-89e4-16d0fc1b4efd" providerId="ADAL" clId="{5A9CEDE8-F954-421E-BEE7-D92F3EE07AEC}" dt="2024-10-12T06:47:13.932" v="65" actId="255"/>
@@ -258,6 +625,45 @@
             <ac:cxnSpMk id="29" creationId="{6CF1BAF6-AD41-4082-B212-8A1F9A2E8779}"/>
           </ac:cxnSpMkLst>
         </pc:cxnChg>
+      </pc:sldChg>
+    </pc:docChg>
+  </pc:docChgLst>
+  <pc:docChgLst>
+    <pc:chgData name="Vasinek Michal" userId="59c221ac-7878-4946-89e4-16d0fc1b4efd" providerId="ADAL" clId="{121F4F25-45C8-4635-942E-C714780CFE95}"/>
+    <pc:docChg chg="modSld">
+      <pc:chgData name="Vasinek Michal" userId="59c221ac-7878-4946-89e4-16d0fc1b4efd" providerId="ADAL" clId="{121F4F25-45C8-4635-942E-C714780CFE95}" dt="2024-10-12T08:15:23.876" v="42" actId="20577"/>
+      <pc:docMkLst>
+        <pc:docMk/>
+      </pc:docMkLst>
+      <pc:sldChg chg="modSp">
+        <pc:chgData name="Vasinek Michal" userId="59c221ac-7878-4946-89e4-16d0fc1b4efd" providerId="ADAL" clId="{121F4F25-45C8-4635-942E-C714780CFE95}" dt="2024-10-12T08:13:21.332" v="12" actId="20577"/>
+        <pc:sldMkLst>
+          <pc:docMk/>
+          <pc:sldMk cId="4052156213" sldId="257"/>
+        </pc:sldMkLst>
+        <pc:graphicFrameChg chg="mod">
+          <ac:chgData name="Vasinek Michal" userId="59c221ac-7878-4946-89e4-16d0fc1b4efd" providerId="ADAL" clId="{121F4F25-45C8-4635-942E-C714780CFE95}" dt="2024-10-12T08:13:21.332" v="12" actId="20577"/>
+          <ac:graphicFrameMkLst>
+            <pc:docMk/>
+            <pc:sldMk cId="4052156213" sldId="257"/>
+            <ac:graphicFrameMk id="22" creationId="{6930A99F-79A8-D586-838E-B3B9C1F19F9E}"/>
+          </ac:graphicFrameMkLst>
+        </pc:graphicFrameChg>
+      </pc:sldChg>
+      <pc:sldChg chg="modSp">
+        <pc:chgData name="Vasinek Michal" userId="59c221ac-7878-4946-89e4-16d0fc1b4efd" providerId="ADAL" clId="{121F4F25-45C8-4635-942E-C714780CFE95}" dt="2024-10-12T08:15:23.876" v="42" actId="20577"/>
+        <pc:sldMkLst>
+          <pc:docMk/>
+          <pc:sldMk cId="1119478773" sldId="259"/>
+        </pc:sldMkLst>
+        <pc:graphicFrameChg chg="mod">
+          <ac:chgData name="Vasinek Michal" userId="59c221ac-7878-4946-89e4-16d0fc1b4efd" providerId="ADAL" clId="{121F4F25-45C8-4635-942E-C714780CFE95}" dt="2024-10-12T08:15:23.876" v="42" actId="20577"/>
+          <ac:graphicFrameMkLst>
+            <pc:docMk/>
+            <pc:sldMk cId="1119478773" sldId="259"/>
+            <ac:graphicFrameMk id="45" creationId="{33C11295-C37C-228C-0249-14685FD36B17}"/>
+          </ac:graphicFrameMkLst>
+        </pc:graphicFrameChg>
       </pc:sldChg>
     </pc:docChg>
   </pc:docChgLst>
@@ -4854,7 +5260,19 @@
           </a:pPr>
           <a:r>
             <a:rPr lang="cs-CZ" dirty="0"/>
-            <a:t>Definice vlastního pozdravu, eliminace přehnané slušnosti.</a:t>
+            <a:t>Definice vlastního pozdravu</a:t>
+          </a:r>
+          <a:r>
+            <a:rPr lang="en-US" dirty="0"/>
+            <a:t> a </a:t>
+          </a:r>
+          <a:r>
+            <a:rPr lang="en-US" dirty="0" err="1"/>
+            <a:t>osloven</a:t>
+          </a:r>
+          <a:r>
+            <a:rPr lang="cs-CZ" dirty="0"/>
+            <a:t>í, eliminace přehnané slušnosti.</a:t>
           </a:r>
           <a:endParaRPr lang="en-US" dirty="0"/>
         </a:p>
@@ -5224,8 +5642,32 @@
             </a:lnSpc>
           </a:pPr>
           <a:r>
+            <a:rPr lang="cs-CZ" dirty="0"/>
+            <a:t>Ukázka kniha objednávek z </a:t>
+          </a:r>
+          <a:r>
+            <a:rPr lang="cs-CZ" dirty="0" err="1"/>
+            <a:t>Coinmate</a:t>
+          </a:r>
+          <a:r>
+            <a:rPr lang="cs-CZ" dirty="0"/>
+            <a:t>. </a:t>
+          </a:r>
+          <a:r>
+            <a:rPr lang="cs-CZ" dirty="0" err="1"/>
+            <a:t>Schema</a:t>
+          </a:r>
+          <a:r>
+            <a:rPr lang="cs-CZ" dirty="0"/>
+            <a:t> ke stažení na </a:t>
+          </a:r>
+          <a:r>
+            <a:rPr lang="cs-CZ" dirty="0" err="1"/>
+            <a:t>githubu</a:t>
+          </a:r>
+          <a:r>
             <a:rPr lang="cs-CZ"/>
-            <a:t>Ukázka kniha objednávek z Coinmate.</a:t>
+            <a:t>.</a:t>
           </a:r>
           <a:endParaRPr lang="en-US"/>
         </a:p>
@@ -6539,7 +6981,19 @@
           </a:pPr>
           <a:r>
             <a:rPr lang="cs-CZ" sz="1500" kern="1200" dirty="0"/>
-            <a:t>Definice vlastního pozdravu, eliminace přehnané slušnosti.</a:t>
+            <a:t>Definice vlastního pozdravu</a:t>
+          </a:r>
+          <a:r>
+            <a:rPr lang="en-US" sz="1500" kern="1200" dirty="0"/>
+            <a:t> a </a:t>
+          </a:r>
+          <a:r>
+            <a:rPr lang="en-US" sz="1500" kern="1200" dirty="0" err="1"/>
+            <a:t>osloven</a:t>
+          </a:r>
+          <a:r>
+            <a:rPr lang="cs-CZ" sz="1500" kern="1200" dirty="0"/>
+            <a:t>í, eliminace přehnané slušnosti.</a:t>
           </a:r>
           <a:endParaRPr lang="en-US" sz="1500" kern="1200" dirty="0"/>
         </a:p>
@@ -7308,8 +7762,32 @@
             <a:buNone/>
           </a:pPr>
           <a:r>
+            <a:rPr lang="cs-CZ" sz="2200" kern="1200" dirty="0"/>
+            <a:t>Ukázka kniha objednávek z </a:t>
+          </a:r>
+          <a:r>
+            <a:rPr lang="cs-CZ" sz="2200" kern="1200" dirty="0" err="1"/>
+            <a:t>Coinmate</a:t>
+          </a:r>
+          <a:r>
+            <a:rPr lang="cs-CZ" sz="2200" kern="1200" dirty="0"/>
+            <a:t>. </a:t>
+          </a:r>
+          <a:r>
+            <a:rPr lang="cs-CZ" sz="2200" kern="1200" dirty="0" err="1"/>
+            <a:t>Schema</a:t>
+          </a:r>
+          <a:r>
+            <a:rPr lang="cs-CZ" sz="2200" kern="1200" dirty="0"/>
+            <a:t> ke stažení na </a:t>
+          </a:r>
+          <a:r>
+            <a:rPr lang="cs-CZ" sz="2200" kern="1200" dirty="0" err="1"/>
+            <a:t>githubu</a:t>
+          </a:r>
+          <a:r>
             <a:rPr lang="cs-CZ" sz="2200" kern="1200"/>
-            <a:t>Ukázka kniha objednávek z Coinmate.</a:t>
+            <a:t>.</a:t>
           </a:r>
           <a:endParaRPr lang="en-US" sz="2200" kern="1200"/>
         </a:p>
@@ -13407,6 +13885,174 @@
 </p:notes>
 </file>
 
+<file path=ppt/notesSlides/notesSlide7.xml><?xml version="1.0" encoding="utf-8"?>
+<p:notes xmlns:a="http://schemas.openxmlformats.org/drawingml/2006/main" xmlns:r="http://schemas.openxmlformats.org/officeDocument/2006/relationships" xmlns:p="http://schemas.openxmlformats.org/presentationml/2006/main">
+  <p:cSld>
+    <p:spTree>
+      <p:nvGrpSpPr>
+        <p:cNvPr id="1" name=""/>
+        <p:cNvGrpSpPr/>
+        <p:nvPr/>
+      </p:nvGrpSpPr>
+      <p:grpSpPr>
+        <a:xfrm>
+          <a:off x="0" y="0"/>
+          <a:ext cx="0" cy="0"/>
+          <a:chOff x="0" y="0"/>
+          <a:chExt cx="0" cy="0"/>
+        </a:xfrm>
+      </p:grpSpPr>
+      <p:sp>
+        <p:nvSpPr>
+          <p:cNvPr id="2" name="Zástupný symbol pro obrázek snímku 1"/>
+          <p:cNvSpPr>
+            <a:spLocks noGrp="1" noRot="1" noChangeAspect="1"/>
+          </p:cNvSpPr>
+          <p:nvPr>
+            <p:ph type="sldImg"/>
+          </p:nvPr>
+        </p:nvSpPr>
+        <p:spPr/>
+      </p:sp>
+      <p:sp>
+        <p:nvSpPr>
+          <p:cNvPr id="3" name="Zástupný symbol pro poznámky 2"/>
+          <p:cNvSpPr>
+            <a:spLocks noGrp="1"/>
+          </p:cNvSpPr>
+          <p:nvPr>
+            <p:ph type="body" idx="1"/>
+          </p:nvPr>
+        </p:nvSpPr>
+        <p:spPr/>
+        <p:txBody>
+          <a:bodyPr/>
+          <a:lstStyle/>
+          <a:p>
+            <a:endParaRPr lang="cs-CZ" dirty="0"/>
+          </a:p>
+        </p:txBody>
+      </p:sp>
+      <p:sp>
+        <p:nvSpPr>
+          <p:cNvPr id="4" name="Zástupný symbol pro číslo snímku 3"/>
+          <p:cNvSpPr>
+            <a:spLocks noGrp="1"/>
+          </p:cNvSpPr>
+          <p:nvPr>
+            <p:ph type="sldNum" sz="quarter" idx="5"/>
+          </p:nvPr>
+        </p:nvSpPr>
+        <p:spPr/>
+        <p:txBody>
+          <a:bodyPr/>
+          <a:lstStyle/>
+          <a:p>
+            <a:fld id="{0FEFE7D6-0470-4EBE-971F-18C1E9276F15}" type="slidenum">
+              <a:rPr lang="cs-CZ" smtClean="0"/>
+              <a:t>16</a:t>
+            </a:fld>
+            <a:endParaRPr lang="cs-CZ"/>
+          </a:p>
+        </p:txBody>
+      </p:sp>
+    </p:spTree>
+    <p:extLst>
+      <p:ext uri="{BB962C8B-B14F-4D97-AF65-F5344CB8AC3E}">
+        <p14:creationId xmlns:p14="http://schemas.microsoft.com/office/powerpoint/2010/main" val="210314107"/>
+      </p:ext>
+    </p:extLst>
+  </p:cSld>
+  <p:clrMapOvr>
+    <a:masterClrMapping/>
+  </p:clrMapOvr>
+</p:notes>
+</file>
+
+<file path=ppt/notesSlides/notesSlide8.xml><?xml version="1.0" encoding="utf-8"?>
+<p:notes xmlns:a="http://schemas.openxmlformats.org/drawingml/2006/main" xmlns:r="http://schemas.openxmlformats.org/officeDocument/2006/relationships" xmlns:p="http://schemas.openxmlformats.org/presentationml/2006/main">
+  <p:cSld>
+    <p:spTree>
+      <p:nvGrpSpPr>
+        <p:cNvPr id="1" name=""/>
+        <p:cNvGrpSpPr/>
+        <p:nvPr/>
+      </p:nvGrpSpPr>
+      <p:grpSpPr>
+        <a:xfrm>
+          <a:off x="0" y="0"/>
+          <a:ext cx="0" cy="0"/>
+          <a:chOff x="0" y="0"/>
+          <a:chExt cx="0" cy="0"/>
+        </a:xfrm>
+      </p:grpSpPr>
+      <p:sp>
+        <p:nvSpPr>
+          <p:cNvPr id="2" name="Zástupný symbol pro obrázek snímku 1"/>
+          <p:cNvSpPr>
+            <a:spLocks noGrp="1" noRot="1" noChangeAspect="1"/>
+          </p:cNvSpPr>
+          <p:nvPr>
+            <p:ph type="sldImg"/>
+          </p:nvPr>
+        </p:nvSpPr>
+        <p:spPr/>
+      </p:sp>
+      <p:sp>
+        <p:nvSpPr>
+          <p:cNvPr id="3" name="Zástupný symbol pro poznámky 2"/>
+          <p:cNvSpPr>
+            <a:spLocks noGrp="1"/>
+          </p:cNvSpPr>
+          <p:nvPr>
+            <p:ph type="body" idx="1"/>
+          </p:nvPr>
+        </p:nvSpPr>
+        <p:spPr/>
+        <p:txBody>
+          <a:bodyPr/>
+          <a:lstStyle/>
+          <a:p>
+            <a:endParaRPr lang="cs-CZ" dirty="0"/>
+          </a:p>
+        </p:txBody>
+      </p:sp>
+      <p:sp>
+        <p:nvSpPr>
+          <p:cNvPr id="4" name="Zástupný symbol pro číslo snímku 3"/>
+          <p:cNvSpPr>
+            <a:spLocks noGrp="1"/>
+          </p:cNvSpPr>
+          <p:nvPr>
+            <p:ph type="sldNum" sz="quarter" idx="5"/>
+          </p:nvPr>
+        </p:nvSpPr>
+        <p:spPr/>
+        <p:txBody>
+          <a:bodyPr/>
+          <a:lstStyle/>
+          <a:p>
+            <a:fld id="{0FEFE7D6-0470-4EBE-971F-18C1E9276F15}" type="slidenum">
+              <a:rPr lang="cs-CZ" smtClean="0"/>
+              <a:t>17</a:t>
+            </a:fld>
+            <a:endParaRPr lang="cs-CZ"/>
+          </a:p>
+        </p:txBody>
+      </p:sp>
+    </p:spTree>
+    <p:extLst>
+      <p:ext uri="{BB962C8B-B14F-4D97-AF65-F5344CB8AC3E}">
+        <p14:creationId xmlns:p14="http://schemas.microsoft.com/office/powerpoint/2010/main" val="623900866"/>
+      </p:ext>
+    </p:extLst>
+  </p:cSld>
+  <p:clrMapOvr>
+    <a:masterClrMapping/>
+  </p:clrMapOvr>
+</p:notes>
+</file>
+
 <file path=ppt/slideLayouts/slideLayout1.xml><?xml version="1.0" encoding="utf-8"?>
 <p:sldLayout xmlns:a="http://schemas.openxmlformats.org/drawingml/2006/main" xmlns:r="http://schemas.openxmlformats.org/officeDocument/2006/relationships" xmlns:p="http://schemas.openxmlformats.org/presentationml/2006/main" type="title" preserve="1">
   <p:cSld name="Úvodní snímek">
@@ -16696,13 +17342,8 @@
           <a:p>
             <a:r>
               <a:rPr lang="cs-CZ" dirty="0"/>
-              <a:t>VŠB – Technická Univerzita </a:t>
+              <a:t>VŠB – Technická Univerzita Ostrava</a:t>
             </a:r>
-            <a:r>
-              <a:rPr lang="cs-CZ" dirty="0" err="1"/>
-              <a:t>Osrava</a:t>
-            </a:r>
-            <a:endParaRPr lang="cs-CZ" dirty="0"/>
           </a:p>
           <a:p>
             <a:endParaRPr lang="cs-CZ" dirty="0"/>
@@ -19688,15 +20329,7 @@
             <a:pPr lvl="1"/>
             <a:r>
               <a:rPr lang="cs-CZ" sz="2200" dirty="0"/>
-              <a:t>„Používej jasný a přímý jazyk a vyhni se složité terminologii. Vyhýbej se příslovcím. Vyhni se módním slovům a místo nich používej jednoduchou češtinu. V relevantních případech použij žargon. </a:t>
-            </a:r>
-            <a:r>
-              <a:rPr lang="cs-CZ" sz="2200"/>
-              <a:t>Vyvaruj </a:t>
-            </a:r>
-            <a:r>
-              <a:rPr lang="cs-CZ" sz="2200" dirty="0"/>
-              <a:t>se přílišného nadšení.“</a:t>
+              <a:t>„Používej jasný a přímý jazyk a vyhni se složité terminologii. Vyhýbej se příslovcím. Vyhni se módním slovům a místo nich používej jednoduchou češtinu. V relevantních případech použij žargon. Vyvaruj se přílišného nadšení.“</a:t>
             </a:r>
           </a:p>
         </p:txBody>
@@ -19776,7 +20409,7 @@
             <p:ph idx="1"/>
             <p:extLst>
               <p:ext uri="{D42A27DB-BD31-4B8C-83A1-F6EECF244321}">
-                <p14:modId xmlns:p14="http://schemas.microsoft.com/office/powerpoint/2010/main" val="1567030090"/>
+                <p14:modId xmlns:p14="http://schemas.microsoft.com/office/powerpoint/2010/main" val="1356607394"/>
               </p:ext>
             </p:extLst>
           </p:nvPr>
@@ -20577,6 +21210,11 @@
           </p:cNvGraphicFramePr>
           <p:nvPr>
             <p:ph idx="1"/>
+            <p:extLst>
+              <p:ext uri="{D42A27DB-BD31-4B8C-83A1-F6EECF244321}">
+                <p14:modId xmlns:p14="http://schemas.microsoft.com/office/powerpoint/2010/main" val="3179307384"/>
+              </p:ext>
+            </p:extLst>
           </p:nvPr>
         </p:nvGraphicFramePr>
         <p:xfrm>
@@ -20603,6 +21241,1158 @@
 </file>
 
 <file path=ppt/slides/slide16.xml><?xml version="1.0" encoding="utf-8"?>
+<p:sld xmlns:a="http://schemas.openxmlformats.org/drawingml/2006/main" xmlns:r="http://schemas.openxmlformats.org/officeDocument/2006/relationships" xmlns:p="http://schemas.openxmlformats.org/presentationml/2006/main">
+  <p:cSld>
+    <p:bg>
+      <p:bgPr>
+        <a:solidFill>
+          <a:schemeClr val="bg1"/>
+        </a:solidFill>
+        <a:effectLst/>
+      </p:bgPr>
+    </p:bg>
+    <p:spTree>
+      <p:nvGrpSpPr>
+        <p:cNvPr id="1" name=""/>
+        <p:cNvGrpSpPr/>
+        <p:nvPr/>
+      </p:nvGrpSpPr>
+      <p:grpSpPr>
+        <a:xfrm>
+          <a:off x="0" y="0"/>
+          <a:ext cx="0" cy="0"/>
+          <a:chOff x="0" y="0"/>
+          <a:chExt cx="0" cy="0"/>
+        </a:xfrm>
+      </p:grpSpPr>
+      <p:sp useBgFill="1">
+        <p:nvSpPr>
+          <p:cNvPr id="63" name="Rectangle 62">
+            <a:extLst>
+              <a:ext uri="{FF2B5EF4-FFF2-40B4-BE49-F238E27FC236}">
+                <a16:creationId xmlns:a16="http://schemas.microsoft.com/office/drawing/2014/main" id="{CBB2B1F0-0DD6-4744-9A46-7A344FB48E40}"/>
+              </a:ext>
+              <a:ext uri="{C183D7F6-B498-43B3-948B-1728B52AA6E4}">
+                <adec:decorative xmlns:adec="http://schemas.microsoft.com/office/drawing/2017/decorative" val="1"/>
+              </a:ext>
+            </a:extLst>
+          </p:cNvPr>
+          <p:cNvSpPr>
+            <a:spLocks noGrp="1" noRot="1" noChangeAspect="1" noMove="1" noResize="1" noEditPoints="1" noAdjustHandles="1" noChangeArrowheads="1" noChangeShapeType="1" noTextEdit="1"/>
+          </p:cNvSpPr>
+          <p:nvPr>
+            <p:extLst>
+              <p:ext uri="{386F3935-93C4-4BCD-93E2-E3B085C9AB24}">
+                <p16:designElem xmlns:p16="http://schemas.microsoft.com/office/powerpoint/2015/main" val="1"/>
+              </p:ext>
+            </p:extLst>
+          </p:nvPr>
+        </p:nvSpPr>
+        <p:spPr>
+          <a:xfrm>
+            <a:off x="0" y="0"/>
+            <a:ext cx="12192000" cy="6858000"/>
+          </a:xfrm>
+          <a:prstGeom prst="rect">
+            <a:avLst/>
+          </a:prstGeom>
+          <a:ln>
+            <a:noFill/>
+          </a:ln>
+        </p:spPr>
+        <p:style>
+          <a:lnRef idx="2">
+            <a:schemeClr val="accent1">
+              <a:shade val="50000"/>
+            </a:schemeClr>
+          </a:lnRef>
+          <a:fillRef idx="1">
+            <a:schemeClr val="accent1"/>
+          </a:fillRef>
+          <a:effectRef idx="0">
+            <a:schemeClr val="accent1"/>
+          </a:effectRef>
+          <a:fontRef idx="minor">
+            <a:schemeClr val="lt1"/>
+          </a:fontRef>
+        </p:style>
+        <p:txBody>
+          <a:bodyPr rtlCol="0" anchor="ctr"/>
+          <a:lstStyle/>
+          <a:p>
+            <a:pPr algn="ctr"/>
+            <a:endParaRPr lang="en-US"/>
+          </a:p>
+        </p:txBody>
+      </p:sp>
+      <p:sp>
+        <p:nvSpPr>
+          <p:cNvPr id="2" name="Nadpis 1">
+            <a:extLst>
+              <a:ext uri="{FF2B5EF4-FFF2-40B4-BE49-F238E27FC236}">
+                <a16:creationId xmlns:a16="http://schemas.microsoft.com/office/drawing/2014/main" id="{FDEEECC2-6B48-8771-0B28-840D7F6B5EB3}"/>
+              </a:ext>
+            </a:extLst>
+          </p:cNvPr>
+          <p:cNvSpPr>
+            <a:spLocks noGrp="1"/>
+          </p:cNvSpPr>
+          <p:nvPr>
+            <p:ph type="title"/>
+          </p:nvPr>
+        </p:nvSpPr>
+        <p:spPr>
+          <a:xfrm>
+            <a:off x="841248" y="426720"/>
+            <a:ext cx="10506456" cy="1919141"/>
+          </a:xfrm>
+        </p:spPr>
+        <p:txBody>
+          <a:bodyPr anchor="b">
+            <a:normAutofit/>
+          </a:bodyPr>
+          <a:lstStyle/>
+          <a:p>
+            <a:r>
+              <a:rPr lang="cs-CZ" sz="6000" dirty="0"/>
+              <a:t>Analýza činností pro řešení pomocí AI</a:t>
+            </a:r>
+          </a:p>
+        </p:txBody>
+      </p:sp>
+      <p:sp>
+        <p:nvSpPr>
+          <p:cNvPr id="65" name="Rectangle 64">
+            <a:extLst>
+              <a:ext uri="{FF2B5EF4-FFF2-40B4-BE49-F238E27FC236}">
+                <a16:creationId xmlns:a16="http://schemas.microsoft.com/office/drawing/2014/main" id="{52D502E5-F6B4-4D58-B4AE-FC466FF15EE8}"/>
+              </a:ext>
+              <a:ext uri="{C183D7F6-B498-43B3-948B-1728B52AA6E4}">
+                <adec:decorative xmlns:adec="http://schemas.microsoft.com/office/drawing/2017/decorative" val="1"/>
+              </a:ext>
+            </a:extLst>
+          </p:cNvPr>
+          <p:cNvSpPr>
+            <a:spLocks noGrp="1" noRot="1" noChangeAspect="1" noMove="1" noResize="1" noEditPoints="1" noAdjustHandles="1" noChangeArrowheads="1" noChangeShapeType="1" noTextEdit="1"/>
+          </p:cNvSpPr>
+          <p:nvPr>
+            <p:extLst>
+              <p:ext uri="{386F3935-93C4-4BCD-93E2-E3B085C9AB24}">
+                <p16:designElem xmlns:p16="http://schemas.microsoft.com/office/powerpoint/2015/main" val="1"/>
+              </p:ext>
+            </p:extLst>
+          </p:nvPr>
+        </p:nvSpPr>
+        <p:spPr>
+          <a:xfrm>
+            <a:off x="865953" y="2899927"/>
+            <a:ext cx="10451592" cy="18288"/>
+          </a:xfrm>
+          <a:prstGeom prst="rect">
+            <a:avLst/>
+          </a:prstGeom>
+          <a:solidFill>
+            <a:srgbClr val="D5D5D5"/>
+          </a:solidFill>
+          <a:ln w="3175">
+            <a:noFill/>
+          </a:ln>
+          <a:effectLst/>
+        </p:spPr>
+        <p:style>
+          <a:lnRef idx="2">
+            <a:schemeClr val="accent1">
+              <a:shade val="50000"/>
+            </a:schemeClr>
+          </a:lnRef>
+          <a:fillRef idx="1">
+            <a:schemeClr val="accent1"/>
+          </a:fillRef>
+          <a:effectRef idx="0">
+            <a:schemeClr val="accent1"/>
+          </a:effectRef>
+          <a:fontRef idx="minor">
+            <a:schemeClr val="lt1"/>
+          </a:fontRef>
+        </p:style>
+        <p:txBody>
+          <a:bodyPr rtlCol="0" anchor="ctr"/>
+          <a:lstStyle/>
+          <a:p>
+            <a:pPr algn="ctr"/>
+            <a:endParaRPr lang="en-US">
+              <a:solidFill>
+                <a:prstClr val="white"/>
+              </a:solidFill>
+              <a:latin typeface="Calibri" panose="020F0502020204030204"/>
+            </a:endParaRPr>
+          </a:p>
+        </p:txBody>
+      </p:sp>
+      <p:sp>
+        <p:nvSpPr>
+          <p:cNvPr id="67" name="Rectangle 66">
+            <a:extLst>
+              <a:ext uri="{FF2B5EF4-FFF2-40B4-BE49-F238E27FC236}">
+                <a16:creationId xmlns:a16="http://schemas.microsoft.com/office/drawing/2014/main" id="{9DECDBF4-02B6-4BB4-B65B-B8107AD6A9E8}"/>
+              </a:ext>
+              <a:ext uri="{C183D7F6-B498-43B3-948B-1728B52AA6E4}">
+                <adec:decorative xmlns:adec="http://schemas.microsoft.com/office/drawing/2017/decorative" val="1"/>
+              </a:ext>
+            </a:extLst>
+          </p:cNvPr>
+          <p:cNvSpPr>
+            <a:spLocks noGrp="1" noRot="1" noChangeAspect="1" noMove="1" noResize="1" noEditPoints="1" noAdjustHandles="1" noChangeArrowheads="1" noChangeShapeType="1" noTextEdit="1"/>
+          </p:cNvSpPr>
+          <p:nvPr>
+            <p:extLst>
+              <p:ext uri="{386F3935-93C4-4BCD-93E2-E3B085C9AB24}">
+                <p16:designElem xmlns:p16="http://schemas.microsoft.com/office/powerpoint/2015/main" val="1"/>
+              </p:ext>
+            </p:extLst>
+          </p:nvPr>
+        </p:nvSpPr>
+        <p:spPr>
+          <a:xfrm flipV="1">
+            <a:off x="841248" y="2776031"/>
+            <a:ext cx="1873457" cy="137160"/>
+          </a:xfrm>
+          <a:prstGeom prst="rect">
+            <a:avLst/>
+          </a:prstGeom>
+          <a:solidFill>
+            <a:schemeClr val="accent2"/>
+          </a:solidFill>
+          <a:ln>
+            <a:noFill/>
+          </a:ln>
+        </p:spPr>
+        <p:style>
+          <a:lnRef idx="2">
+            <a:schemeClr val="accent1">
+              <a:shade val="50000"/>
+            </a:schemeClr>
+          </a:lnRef>
+          <a:fillRef idx="1">
+            <a:schemeClr val="accent1"/>
+          </a:fillRef>
+          <a:effectRef idx="0">
+            <a:schemeClr val="accent1"/>
+          </a:effectRef>
+          <a:fontRef idx="minor">
+            <a:schemeClr val="lt1"/>
+          </a:fontRef>
+        </p:style>
+        <p:txBody>
+          <a:bodyPr rtlCol="0" anchor="ctr"/>
+          <a:lstStyle/>
+          <a:p>
+            <a:pPr algn="ctr"/>
+            <a:endParaRPr lang="en-US">
+              <a:solidFill>
+                <a:prstClr val="white"/>
+              </a:solidFill>
+              <a:latin typeface="Calibri" panose="020F0502020204030204"/>
+            </a:endParaRPr>
+          </a:p>
+        </p:txBody>
+      </p:sp>
+      <p:sp>
+        <p:nvSpPr>
+          <p:cNvPr id="41" name="Zástupný obsah 2">
+            <a:extLst>
+              <a:ext uri="{FF2B5EF4-FFF2-40B4-BE49-F238E27FC236}">
+                <a16:creationId xmlns:a16="http://schemas.microsoft.com/office/drawing/2014/main" id="{EDCAE6CD-06AF-F93A-84E4-F21E685F17C9}"/>
+              </a:ext>
+            </a:extLst>
+          </p:cNvPr>
+          <p:cNvSpPr>
+            <a:spLocks noGrp="1"/>
+          </p:cNvSpPr>
+          <p:nvPr>
+            <p:ph idx="1"/>
+          </p:nvPr>
+        </p:nvSpPr>
+        <p:spPr>
+          <a:xfrm>
+            <a:off x="841248" y="3337269"/>
+            <a:ext cx="10509504" cy="2905686"/>
+          </a:xfrm>
+        </p:spPr>
+        <p:txBody>
+          <a:bodyPr>
+            <a:normAutofit/>
+          </a:bodyPr>
+          <a:lstStyle/>
+          <a:p>
+            <a:endParaRPr lang="cs-CZ" sz="1500" dirty="0"/>
+          </a:p>
+          <a:p>
+            <a:r>
+              <a:rPr lang="cs-CZ" sz="1500" dirty="0"/>
+              <a:t>„Navrhni mi … </a:t>
+            </a:r>
+          </a:p>
+          <a:p>
+            <a:r>
+              <a:rPr lang="cs-CZ" sz="1500" dirty="0"/>
+              <a:t>Proces – Mé činnosti ráno</a:t>
+            </a:r>
+          </a:p>
+          <a:p>
+            <a:pPr lvl="1"/>
+            <a:r>
+              <a:rPr lang="cs-CZ" sz="1500" dirty="0"/>
+              <a:t>Vstanu</a:t>
+            </a:r>
+          </a:p>
+          <a:p>
+            <a:pPr lvl="1"/>
+            <a:r>
+              <a:rPr lang="cs-CZ" sz="1500" dirty="0"/>
+              <a:t>Jdu do kuchyně</a:t>
+            </a:r>
+          </a:p>
+          <a:p>
+            <a:pPr lvl="1"/>
+            <a:r>
+              <a:rPr lang="cs-CZ" sz="1500" dirty="0"/>
+              <a:t>Vypiju sklenici vody</a:t>
+            </a:r>
+          </a:p>
+          <a:p>
+            <a:pPr lvl="1"/>
+            <a:r>
+              <a:rPr lang="cs-CZ" sz="1500" dirty="0"/>
+              <a:t>Uvařím si kávu</a:t>
+            </a:r>
+          </a:p>
+          <a:p>
+            <a:pPr lvl="1"/>
+            <a:r>
+              <a:rPr lang="cs-CZ" sz="1500" dirty="0"/>
+              <a:t>S mobilem v ruce čtu ranní novinky a piju kávu</a:t>
+            </a:r>
+          </a:p>
+          <a:p>
+            <a:pPr marL="0" indent="0">
+              <a:buNone/>
+            </a:pPr>
+            <a:r>
+              <a:rPr lang="cs-CZ" sz="1500" dirty="0"/>
+              <a:t>Analyzuj mi možnosti, jak bych tě mohl využit, tím myslím tebe jako </a:t>
+            </a:r>
+            <a:r>
+              <a:rPr lang="cs-CZ" sz="1500" dirty="0" err="1"/>
+              <a:t>chatGPT</a:t>
+            </a:r>
+            <a:r>
+              <a:rPr lang="cs-CZ" sz="1500" dirty="0"/>
+              <a:t>, jako umělou inteligenci v těchto </a:t>
+            </a:r>
+            <a:r>
+              <a:rPr lang="en-US" sz="1500" dirty="0"/>
+              <a:t>[[</a:t>
+            </a:r>
+            <a:r>
+              <a:rPr lang="cs-CZ" sz="1500" dirty="0"/>
+              <a:t>činnostech</a:t>
+            </a:r>
+            <a:r>
+              <a:rPr lang="en-US" sz="1500" dirty="0"/>
+              <a:t>]]</a:t>
+            </a:r>
+            <a:r>
+              <a:rPr lang="cs-CZ" sz="1500" dirty="0"/>
+              <a:t> tohoto </a:t>
+            </a:r>
+            <a:r>
+              <a:rPr lang="en-US" sz="1500" dirty="0"/>
+              <a:t>[[</a:t>
+            </a:r>
+            <a:r>
+              <a:rPr lang="cs-CZ" sz="1500" dirty="0"/>
+              <a:t>procesu</a:t>
+            </a:r>
+            <a:r>
+              <a:rPr lang="en-US" sz="1500" dirty="0"/>
+              <a:t>]]</a:t>
+            </a:r>
+            <a:r>
+              <a:rPr lang="cs-CZ" sz="1500" dirty="0"/>
+              <a:t>. </a:t>
+            </a:r>
+          </a:p>
+          <a:p>
+            <a:pPr marL="457200" lvl="1" indent="0">
+              <a:buNone/>
+            </a:pPr>
+            <a:endParaRPr lang="cs-CZ" sz="1500" dirty="0"/>
+          </a:p>
+          <a:p>
+            <a:pPr lvl="1"/>
+            <a:endParaRPr lang="cs-CZ" sz="1500" dirty="0"/>
+          </a:p>
+          <a:p>
+            <a:pPr lvl="1"/>
+            <a:endParaRPr lang="cs-CZ" sz="1500" dirty="0"/>
+          </a:p>
+          <a:p>
+            <a:pPr lvl="1"/>
+            <a:endParaRPr lang="cs-CZ" sz="1500" dirty="0"/>
+          </a:p>
+        </p:txBody>
+      </p:sp>
+    </p:spTree>
+    <p:extLst>
+      <p:ext uri="{BB962C8B-B14F-4D97-AF65-F5344CB8AC3E}">
+        <p14:creationId xmlns:p14="http://schemas.microsoft.com/office/powerpoint/2010/main" val="871494376"/>
+      </p:ext>
+    </p:extLst>
+  </p:cSld>
+  <p:clrMapOvr>
+    <a:masterClrMapping/>
+  </p:clrMapOvr>
+</p:sld>
+</file>
+
+<file path=ppt/slides/slide17.xml><?xml version="1.0" encoding="utf-8"?>
+<p:sld xmlns:a="http://schemas.openxmlformats.org/drawingml/2006/main" xmlns:r="http://schemas.openxmlformats.org/officeDocument/2006/relationships" xmlns:p="http://schemas.openxmlformats.org/presentationml/2006/main">
+  <p:cSld>
+    <p:bg>
+      <p:bgPr>
+        <a:solidFill>
+          <a:schemeClr val="bg1"/>
+        </a:solidFill>
+        <a:effectLst/>
+      </p:bgPr>
+    </p:bg>
+    <p:spTree>
+      <p:nvGrpSpPr>
+        <p:cNvPr id="1" name=""/>
+        <p:cNvGrpSpPr/>
+        <p:nvPr/>
+      </p:nvGrpSpPr>
+      <p:grpSpPr>
+        <a:xfrm>
+          <a:off x="0" y="0"/>
+          <a:ext cx="0" cy="0"/>
+          <a:chOff x="0" y="0"/>
+          <a:chExt cx="0" cy="0"/>
+        </a:xfrm>
+      </p:grpSpPr>
+      <p:sp useBgFill="1">
+        <p:nvSpPr>
+          <p:cNvPr id="5" name="Rectangle 7">
+            <a:extLst>
+              <a:ext uri="{FF2B5EF4-FFF2-40B4-BE49-F238E27FC236}">
+                <a16:creationId xmlns:a16="http://schemas.microsoft.com/office/drawing/2014/main" id="{CBB2B1F0-0DD6-4744-9A46-7A344FB48E40}"/>
+              </a:ext>
+              <a:ext uri="{C183D7F6-B498-43B3-948B-1728B52AA6E4}">
+                <adec:decorative xmlns:adec="http://schemas.microsoft.com/office/drawing/2017/decorative" val="1"/>
+              </a:ext>
+            </a:extLst>
+          </p:cNvPr>
+          <p:cNvSpPr>
+            <a:spLocks noGrp="1" noRot="1" noChangeAspect="1" noMove="1" noResize="1" noEditPoints="1" noAdjustHandles="1" noChangeArrowheads="1" noChangeShapeType="1" noTextEdit="1"/>
+          </p:cNvSpPr>
+          <p:nvPr>
+            <p:extLst>
+              <p:ext uri="{386F3935-93C4-4BCD-93E2-E3B085C9AB24}">
+                <p16:designElem xmlns:p16="http://schemas.microsoft.com/office/powerpoint/2015/main" val="1"/>
+              </p:ext>
+            </p:extLst>
+          </p:nvPr>
+        </p:nvSpPr>
+        <p:spPr>
+          <a:xfrm>
+            <a:off x="0" y="0"/>
+            <a:ext cx="12192000" cy="6858000"/>
+          </a:xfrm>
+          <a:prstGeom prst="rect">
+            <a:avLst/>
+          </a:prstGeom>
+          <a:ln>
+            <a:noFill/>
+          </a:ln>
+        </p:spPr>
+        <p:style>
+          <a:lnRef idx="2">
+            <a:schemeClr val="accent1">
+              <a:shade val="50000"/>
+            </a:schemeClr>
+          </a:lnRef>
+          <a:fillRef idx="1">
+            <a:schemeClr val="accent1"/>
+          </a:fillRef>
+          <a:effectRef idx="0">
+            <a:schemeClr val="accent1"/>
+          </a:effectRef>
+          <a:fontRef idx="minor">
+            <a:schemeClr val="lt1"/>
+          </a:fontRef>
+        </p:style>
+        <p:txBody>
+          <a:bodyPr rtlCol="0" anchor="ctr"/>
+          <a:lstStyle/>
+          <a:p>
+            <a:pPr algn="ctr"/>
+            <a:endParaRPr lang="en-US"/>
+          </a:p>
+        </p:txBody>
+      </p:sp>
+      <p:sp>
+        <p:nvSpPr>
+          <p:cNvPr id="2" name="Nadpis 1">
+            <a:extLst>
+              <a:ext uri="{FF2B5EF4-FFF2-40B4-BE49-F238E27FC236}">
+                <a16:creationId xmlns:a16="http://schemas.microsoft.com/office/drawing/2014/main" id="{37FBB45F-54F0-BBB0-8E06-9ECD9F426B81}"/>
+              </a:ext>
+            </a:extLst>
+          </p:cNvPr>
+          <p:cNvSpPr>
+            <a:spLocks noGrp="1"/>
+          </p:cNvSpPr>
+          <p:nvPr>
+            <p:ph type="title"/>
+          </p:nvPr>
+        </p:nvSpPr>
+        <p:spPr>
+          <a:xfrm>
+            <a:off x="841248" y="426720"/>
+            <a:ext cx="10506456" cy="1919141"/>
+          </a:xfrm>
+        </p:spPr>
+        <p:txBody>
+          <a:bodyPr anchor="b">
+            <a:normAutofit/>
+          </a:bodyPr>
+          <a:lstStyle/>
+          <a:p>
+            <a:r>
+              <a:rPr lang="cs-CZ" sz="6000"/>
+              <a:t>Proces s pomocí AI</a:t>
+            </a:r>
+          </a:p>
+        </p:txBody>
+      </p:sp>
+      <p:sp>
+        <p:nvSpPr>
+          <p:cNvPr id="6" name="Rectangle 9">
+            <a:extLst>
+              <a:ext uri="{FF2B5EF4-FFF2-40B4-BE49-F238E27FC236}">
+                <a16:creationId xmlns:a16="http://schemas.microsoft.com/office/drawing/2014/main" id="{52D502E5-F6B4-4D58-B4AE-FC466FF15EE8}"/>
+              </a:ext>
+              <a:ext uri="{C183D7F6-B498-43B3-948B-1728B52AA6E4}">
+                <adec:decorative xmlns:adec="http://schemas.microsoft.com/office/drawing/2017/decorative" val="1"/>
+              </a:ext>
+            </a:extLst>
+          </p:cNvPr>
+          <p:cNvSpPr>
+            <a:spLocks noGrp="1" noRot="1" noChangeAspect="1" noMove="1" noResize="1" noEditPoints="1" noAdjustHandles="1" noChangeArrowheads="1" noChangeShapeType="1" noTextEdit="1"/>
+          </p:cNvSpPr>
+          <p:nvPr>
+            <p:extLst>
+              <p:ext uri="{386F3935-93C4-4BCD-93E2-E3B085C9AB24}">
+                <p16:designElem xmlns:p16="http://schemas.microsoft.com/office/powerpoint/2015/main" val="1"/>
+              </p:ext>
+            </p:extLst>
+          </p:nvPr>
+        </p:nvSpPr>
+        <p:spPr>
+          <a:xfrm>
+            <a:off x="865953" y="2899927"/>
+            <a:ext cx="10451592" cy="18288"/>
+          </a:xfrm>
+          <a:prstGeom prst="rect">
+            <a:avLst/>
+          </a:prstGeom>
+          <a:solidFill>
+            <a:srgbClr val="D5D5D5"/>
+          </a:solidFill>
+          <a:ln w="3175">
+            <a:noFill/>
+          </a:ln>
+          <a:effectLst/>
+        </p:spPr>
+        <p:style>
+          <a:lnRef idx="2">
+            <a:schemeClr val="accent1">
+              <a:shade val="50000"/>
+            </a:schemeClr>
+          </a:lnRef>
+          <a:fillRef idx="1">
+            <a:schemeClr val="accent1"/>
+          </a:fillRef>
+          <a:effectRef idx="0">
+            <a:schemeClr val="accent1"/>
+          </a:effectRef>
+          <a:fontRef idx="minor">
+            <a:schemeClr val="lt1"/>
+          </a:fontRef>
+        </p:style>
+        <p:txBody>
+          <a:bodyPr rtlCol="0" anchor="ctr"/>
+          <a:lstStyle/>
+          <a:p>
+            <a:pPr algn="ctr"/>
+            <a:endParaRPr lang="en-US">
+              <a:solidFill>
+                <a:prstClr val="white"/>
+              </a:solidFill>
+              <a:latin typeface="Calibri" panose="020F0502020204030204"/>
+            </a:endParaRPr>
+          </a:p>
+        </p:txBody>
+      </p:sp>
+      <p:sp>
+        <p:nvSpPr>
+          <p:cNvPr id="12" name="Rectangle 11">
+            <a:extLst>
+              <a:ext uri="{FF2B5EF4-FFF2-40B4-BE49-F238E27FC236}">
+                <a16:creationId xmlns:a16="http://schemas.microsoft.com/office/drawing/2014/main" id="{9DECDBF4-02B6-4BB4-B65B-B8107AD6A9E8}"/>
+              </a:ext>
+              <a:ext uri="{C183D7F6-B498-43B3-948B-1728B52AA6E4}">
+                <adec:decorative xmlns:adec="http://schemas.microsoft.com/office/drawing/2017/decorative" val="1"/>
+              </a:ext>
+            </a:extLst>
+          </p:cNvPr>
+          <p:cNvSpPr>
+            <a:spLocks noGrp="1" noRot="1" noChangeAspect="1" noMove="1" noResize="1" noEditPoints="1" noAdjustHandles="1" noChangeArrowheads="1" noChangeShapeType="1" noTextEdit="1"/>
+          </p:cNvSpPr>
+          <p:nvPr>
+            <p:extLst>
+              <p:ext uri="{386F3935-93C4-4BCD-93E2-E3B085C9AB24}">
+                <p16:designElem xmlns:p16="http://schemas.microsoft.com/office/powerpoint/2015/main" val="1"/>
+              </p:ext>
+            </p:extLst>
+          </p:nvPr>
+        </p:nvSpPr>
+        <p:spPr>
+          <a:xfrm flipV="1">
+            <a:off x="841248" y="2776031"/>
+            <a:ext cx="1873457" cy="137160"/>
+          </a:xfrm>
+          <a:prstGeom prst="rect">
+            <a:avLst/>
+          </a:prstGeom>
+          <a:solidFill>
+            <a:schemeClr val="accent2"/>
+          </a:solidFill>
+          <a:ln>
+            <a:noFill/>
+          </a:ln>
+        </p:spPr>
+        <p:style>
+          <a:lnRef idx="2">
+            <a:schemeClr val="accent1">
+              <a:shade val="50000"/>
+            </a:schemeClr>
+          </a:lnRef>
+          <a:fillRef idx="1">
+            <a:schemeClr val="accent1"/>
+          </a:fillRef>
+          <a:effectRef idx="0">
+            <a:schemeClr val="accent1"/>
+          </a:effectRef>
+          <a:fontRef idx="minor">
+            <a:schemeClr val="lt1"/>
+          </a:fontRef>
+        </p:style>
+        <p:txBody>
+          <a:bodyPr rtlCol="0" anchor="ctr"/>
+          <a:lstStyle/>
+          <a:p>
+            <a:pPr algn="ctr"/>
+            <a:endParaRPr lang="en-US">
+              <a:solidFill>
+                <a:prstClr val="white"/>
+              </a:solidFill>
+              <a:latin typeface="Calibri" panose="020F0502020204030204"/>
+            </a:endParaRPr>
+          </a:p>
+        </p:txBody>
+      </p:sp>
+      <p:sp>
+        <p:nvSpPr>
+          <p:cNvPr id="3" name="Zástupný obsah 2">
+            <a:extLst>
+              <a:ext uri="{FF2B5EF4-FFF2-40B4-BE49-F238E27FC236}">
+                <a16:creationId xmlns:a16="http://schemas.microsoft.com/office/drawing/2014/main" id="{351AB4D8-A324-5713-6827-001D8F716EB8}"/>
+              </a:ext>
+            </a:extLst>
+          </p:cNvPr>
+          <p:cNvSpPr>
+            <a:spLocks noGrp="1"/>
+          </p:cNvSpPr>
+          <p:nvPr>
+            <p:ph idx="1"/>
+          </p:nvPr>
+        </p:nvSpPr>
+        <p:spPr>
+          <a:xfrm>
+            <a:off x="841248" y="3337269"/>
+            <a:ext cx="10509504" cy="2905686"/>
+          </a:xfrm>
+        </p:spPr>
+        <p:txBody>
+          <a:bodyPr>
+            <a:normAutofit/>
+          </a:bodyPr>
+          <a:lstStyle/>
+          <a:p>
+            <a:r>
+              <a:rPr lang="cs-CZ" sz="2000"/>
+              <a:t>Proces:</a:t>
+            </a:r>
+          </a:p>
+          <a:p>
+            <a:pPr lvl="1"/>
+            <a:r>
+              <a:rPr lang="cs-CZ" sz="2000"/>
+              <a:t>Činnost</a:t>
+            </a:r>
+          </a:p>
+          <a:p>
+            <a:pPr lvl="1"/>
+            <a:r>
+              <a:rPr lang="cs-CZ" sz="2000"/>
+              <a:t>Činnost</a:t>
+            </a:r>
+          </a:p>
+          <a:p>
+            <a:pPr lvl="1"/>
+            <a:r>
+              <a:rPr lang="cs-CZ" sz="2000"/>
+              <a:t>…</a:t>
+            </a:r>
+          </a:p>
+          <a:p>
+            <a:pPr lvl="1"/>
+            <a:r>
+              <a:rPr lang="cs-CZ" sz="2000"/>
+              <a:t>Činnost</a:t>
+            </a:r>
+          </a:p>
+          <a:p>
+            <a:pPr lvl="1"/>
+            <a:r>
+              <a:rPr lang="cs-CZ" sz="2000"/>
+              <a:t>Konec</a:t>
+            </a:r>
+          </a:p>
+          <a:p>
+            <a:pPr marL="0" indent="0">
+              <a:buNone/>
+            </a:pPr>
+            <a:r>
+              <a:rPr lang="cs-CZ" sz="2000"/>
+              <a:t>Analyzuj mi možnosti, jak bych tě mohl využit, tím myslím tebe jako chatGPT, jako umělou inteligenci v těchto </a:t>
+            </a:r>
+            <a:r>
+              <a:rPr lang="en-US" sz="2000"/>
+              <a:t>[[</a:t>
+            </a:r>
+            <a:r>
+              <a:rPr lang="cs-CZ" sz="2000"/>
+              <a:t>činnostech</a:t>
+            </a:r>
+            <a:r>
+              <a:rPr lang="en-US" sz="2000"/>
+              <a:t>]]</a:t>
+            </a:r>
+            <a:r>
+              <a:rPr lang="cs-CZ" sz="2000"/>
+              <a:t> tohoto </a:t>
+            </a:r>
+            <a:r>
+              <a:rPr lang="en-US" sz="2000"/>
+              <a:t>[[</a:t>
+            </a:r>
+            <a:r>
+              <a:rPr lang="cs-CZ" sz="2000"/>
+              <a:t>procesu</a:t>
+            </a:r>
+            <a:r>
+              <a:rPr lang="en-US" sz="2000"/>
+              <a:t>]]</a:t>
+            </a:r>
+            <a:r>
+              <a:rPr lang="cs-CZ" sz="2000"/>
+              <a:t>. </a:t>
+            </a:r>
+          </a:p>
+        </p:txBody>
+      </p:sp>
+    </p:spTree>
+    <p:extLst>
+      <p:ext uri="{BB962C8B-B14F-4D97-AF65-F5344CB8AC3E}">
+        <p14:creationId xmlns:p14="http://schemas.microsoft.com/office/powerpoint/2010/main" val="778866854"/>
+      </p:ext>
+    </p:extLst>
+  </p:cSld>
+  <p:clrMapOvr>
+    <a:masterClrMapping/>
+  </p:clrMapOvr>
+</p:sld>
+</file>
+
+<file path=ppt/slides/slide18.xml><?xml version="1.0" encoding="utf-8"?>
+<p:sld xmlns:a="http://schemas.openxmlformats.org/drawingml/2006/main" xmlns:r="http://schemas.openxmlformats.org/officeDocument/2006/relationships" xmlns:p="http://schemas.openxmlformats.org/presentationml/2006/main">
+  <p:cSld>
+    <p:bg>
+      <p:bgPr>
+        <a:solidFill>
+          <a:schemeClr val="bg1"/>
+        </a:solidFill>
+        <a:effectLst/>
+      </p:bgPr>
+    </p:bg>
+    <p:spTree>
+      <p:nvGrpSpPr>
+        <p:cNvPr id="1" name=""/>
+        <p:cNvGrpSpPr/>
+        <p:nvPr/>
+      </p:nvGrpSpPr>
+      <p:grpSpPr>
+        <a:xfrm>
+          <a:off x="0" y="0"/>
+          <a:ext cx="0" cy="0"/>
+          <a:chOff x="0" y="0"/>
+          <a:chExt cx="0" cy="0"/>
+        </a:xfrm>
+      </p:grpSpPr>
+      <p:sp useBgFill="1">
+        <p:nvSpPr>
+          <p:cNvPr id="5" name="Rectangle 7">
+            <a:extLst>
+              <a:ext uri="{FF2B5EF4-FFF2-40B4-BE49-F238E27FC236}">
+                <a16:creationId xmlns:a16="http://schemas.microsoft.com/office/drawing/2014/main" id="{CBB2B1F0-0DD6-4744-9A46-7A344FB48E40}"/>
+              </a:ext>
+              <a:ext uri="{C183D7F6-B498-43B3-948B-1728B52AA6E4}">
+                <adec:decorative xmlns:adec="http://schemas.microsoft.com/office/drawing/2017/decorative" val="1"/>
+              </a:ext>
+            </a:extLst>
+          </p:cNvPr>
+          <p:cNvSpPr>
+            <a:spLocks noGrp="1" noRot="1" noChangeAspect="1" noMove="1" noResize="1" noEditPoints="1" noAdjustHandles="1" noChangeArrowheads="1" noChangeShapeType="1" noTextEdit="1"/>
+          </p:cNvSpPr>
+          <p:nvPr>
+            <p:extLst>
+              <p:ext uri="{386F3935-93C4-4BCD-93E2-E3B085C9AB24}">
+                <p16:designElem xmlns:p16="http://schemas.microsoft.com/office/powerpoint/2015/main" val="1"/>
+              </p:ext>
+            </p:extLst>
+          </p:nvPr>
+        </p:nvSpPr>
+        <p:spPr>
+          <a:xfrm>
+            <a:off x="0" y="0"/>
+            <a:ext cx="12192000" cy="6858000"/>
+          </a:xfrm>
+          <a:prstGeom prst="rect">
+            <a:avLst/>
+          </a:prstGeom>
+          <a:ln>
+            <a:noFill/>
+          </a:ln>
+        </p:spPr>
+        <p:style>
+          <a:lnRef idx="2">
+            <a:schemeClr val="accent1">
+              <a:shade val="50000"/>
+            </a:schemeClr>
+          </a:lnRef>
+          <a:fillRef idx="1">
+            <a:schemeClr val="accent1"/>
+          </a:fillRef>
+          <a:effectRef idx="0">
+            <a:schemeClr val="accent1"/>
+          </a:effectRef>
+          <a:fontRef idx="minor">
+            <a:schemeClr val="lt1"/>
+          </a:fontRef>
+        </p:style>
+        <p:txBody>
+          <a:bodyPr rtlCol="0" anchor="ctr"/>
+          <a:lstStyle/>
+          <a:p>
+            <a:pPr algn="ctr"/>
+            <a:endParaRPr lang="en-US"/>
+          </a:p>
+        </p:txBody>
+      </p:sp>
+      <p:sp>
+        <p:nvSpPr>
+          <p:cNvPr id="2" name="Nadpis 1">
+            <a:extLst>
+              <a:ext uri="{FF2B5EF4-FFF2-40B4-BE49-F238E27FC236}">
+                <a16:creationId xmlns:a16="http://schemas.microsoft.com/office/drawing/2014/main" id="{7063A2BA-8A70-D43B-3D5A-4BFEEB414568}"/>
+              </a:ext>
+            </a:extLst>
+          </p:cNvPr>
+          <p:cNvSpPr>
+            <a:spLocks noGrp="1"/>
+          </p:cNvSpPr>
+          <p:nvPr>
+            <p:ph type="title"/>
+          </p:nvPr>
+        </p:nvSpPr>
+        <p:spPr>
+          <a:xfrm>
+            <a:off x="841248" y="426720"/>
+            <a:ext cx="10506456" cy="1919141"/>
+          </a:xfrm>
+        </p:spPr>
+        <p:txBody>
+          <a:bodyPr anchor="b">
+            <a:normAutofit/>
+          </a:bodyPr>
+          <a:lstStyle/>
+          <a:p>
+            <a:r>
+              <a:rPr lang="cs-CZ" sz="6000" dirty="0"/>
+              <a:t>Nejsem těžař </a:t>
+            </a:r>
+            <a:r>
+              <a:rPr lang="cs-CZ" sz="6000" dirty="0" err="1"/>
+              <a:t>bitcoinu</a:t>
+            </a:r>
+            <a:endParaRPr lang="cs-CZ" sz="6000" dirty="0"/>
+          </a:p>
+        </p:txBody>
+      </p:sp>
+      <p:sp>
+        <p:nvSpPr>
+          <p:cNvPr id="6" name="Rectangle 9">
+            <a:extLst>
+              <a:ext uri="{FF2B5EF4-FFF2-40B4-BE49-F238E27FC236}">
+                <a16:creationId xmlns:a16="http://schemas.microsoft.com/office/drawing/2014/main" id="{52D502E5-F6B4-4D58-B4AE-FC466FF15EE8}"/>
+              </a:ext>
+              <a:ext uri="{C183D7F6-B498-43B3-948B-1728B52AA6E4}">
+                <adec:decorative xmlns:adec="http://schemas.microsoft.com/office/drawing/2017/decorative" val="1"/>
+              </a:ext>
+            </a:extLst>
+          </p:cNvPr>
+          <p:cNvSpPr>
+            <a:spLocks noGrp="1" noRot="1" noChangeAspect="1" noMove="1" noResize="1" noEditPoints="1" noAdjustHandles="1" noChangeArrowheads="1" noChangeShapeType="1" noTextEdit="1"/>
+          </p:cNvSpPr>
+          <p:nvPr>
+            <p:extLst>
+              <p:ext uri="{386F3935-93C4-4BCD-93E2-E3B085C9AB24}">
+                <p16:designElem xmlns:p16="http://schemas.microsoft.com/office/powerpoint/2015/main" val="1"/>
+              </p:ext>
+            </p:extLst>
+          </p:nvPr>
+        </p:nvSpPr>
+        <p:spPr>
+          <a:xfrm>
+            <a:off x="865953" y="2899927"/>
+            <a:ext cx="10451592" cy="18288"/>
+          </a:xfrm>
+          <a:prstGeom prst="rect">
+            <a:avLst/>
+          </a:prstGeom>
+          <a:solidFill>
+            <a:srgbClr val="D5D5D5"/>
+          </a:solidFill>
+          <a:ln w="3175">
+            <a:noFill/>
+          </a:ln>
+          <a:effectLst/>
+        </p:spPr>
+        <p:style>
+          <a:lnRef idx="2">
+            <a:schemeClr val="accent1">
+              <a:shade val="50000"/>
+            </a:schemeClr>
+          </a:lnRef>
+          <a:fillRef idx="1">
+            <a:schemeClr val="accent1"/>
+          </a:fillRef>
+          <a:effectRef idx="0">
+            <a:schemeClr val="accent1"/>
+          </a:effectRef>
+          <a:fontRef idx="minor">
+            <a:schemeClr val="lt1"/>
+          </a:fontRef>
+        </p:style>
+        <p:txBody>
+          <a:bodyPr rtlCol="0" anchor="ctr"/>
+          <a:lstStyle/>
+          <a:p>
+            <a:pPr algn="ctr"/>
+            <a:endParaRPr lang="en-US">
+              <a:solidFill>
+                <a:prstClr val="white"/>
+              </a:solidFill>
+              <a:latin typeface="Calibri" panose="020F0502020204030204"/>
+            </a:endParaRPr>
+          </a:p>
+        </p:txBody>
+      </p:sp>
+      <p:sp>
+        <p:nvSpPr>
+          <p:cNvPr id="12" name="Rectangle 11">
+            <a:extLst>
+              <a:ext uri="{FF2B5EF4-FFF2-40B4-BE49-F238E27FC236}">
+                <a16:creationId xmlns:a16="http://schemas.microsoft.com/office/drawing/2014/main" id="{9DECDBF4-02B6-4BB4-B65B-B8107AD6A9E8}"/>
+              </a:ext>
+              <a:ext uri="{C183D7F6-B498-43B3-948B-1728B52AA6E4}">
+                <adec:decorative xmlns:adec="http://schemas.microsoft.com/office/drawing/2017/decorative" val="1"/>
+              </a:ext>
+            </a:extLst>
+          </p:cNvPr>
+          <p:cNvSpPr>
+            <a:spLocks noGrp="1" noRot="1" noChangeAspect="1" noMove="1" noResize="1" noEditPoints="1" noAdjustHandles="1" noChangeArrowheads="1" noChangeShapeType="1" noTextEdit="1"/>
+          </p:cNvSpPr>
+          <p:nvPr>
+            <p:extLst>
+              <p:ext uri="{386F3935-93C4-4BCD-93E2-E3B085C9AB24}">
+                <p16:designElem xmlns:p16="http://schemas.microsoft.com/office/powerpoint/2015/main" val="1"/>
+              </p:ext>
+            </p:extLst>
+          </p:nvPr>
+        </p:nvSpPr>
+        <p:spPr>
+          <a:xfrm flipV="1">
+            <a:off x="841248" y="2776031"/>
+            <a:ext cx="1873457" cy="137160"/>
+          </a:xfrm>
+          <a:prstGeom prst="rect">
+            <a:avLst/>
+          </a:prstGeom>
+          <a:solidFill>
+            <a:schemeClr val="accent2"/>
+          </a:solidFill>
+          <a:ln>
+            <a:noFill/>
+          </a:ln>
+        </p:spPr>
+        <p:style>
+          <a:lnRef idx="2">
+            <a:schemeClr val="accent1">
+              <a:shade val="50000"/>
+            </a:schemeClr>
+          </a:lnRef>
+          <a:fillRef idx="1">
+            <a:schemeClr val="accent1"/>
+          </a:fillRef>
+          <a:effectRef idx="0">
+            <a:schemeClr val="accent1"/>
+          </a:effectRef>
+          <a:fontRef idx="minor">
+            <a:schemeClr val="lt1"/>
+          </a:fontRef>
+        </p:style>
+        <p:txBody>
+          <a:bodyPr rtlCol="0" anchor="ctr"/>
+          <a:lstStyle/>
+          <a:p>
+            <a:pPr algn="ctr"/>
+            <a:endParaRPr lang="en-US">
+              <a:solidFill>
+                <a:prstClr val="white"/>
+              </a:solidFill>
+              <a:latin typeface="Calibri" panose="020F0502020204030204"/>
+            </a:endParaRPr>
+          </a:p>
+        </p:txBody>
+      </p:sp>
+      <p:sp>
+        <p:nvSpPr>
+          <p:cNvPr id="3" name="Zástupný obsah 2">
+            <a:extLst>
+              <a:ext uri="{FF2B5EF4-FFF2-40B4-BE49-F238E27FC236}">
+                <a16:creationId xmlns:a16="http://schemas.microsoft.com/office/drawing/2014/main" id="{B92A4BCA-3B7D-3E14-DBA9-EF81AEC07A35}"/>
+              </a:ext>
+            </a:extLst>
+          </p:cNvPr>
+          <p:cNvSpPr>
+            <a:spLocks noGrp="1"/>
+          </p:cNvSpPr>
+          <p:nvPr>
+            <p:ph idx="1"/>
+          </p:nvPr>
+        </p:nvSpPr>
+        <p:spPr>
+          <a:xfrm>
+            <a:off x="841248" y="3337269"/>
+            <a:ext cx="10509504" cy="2905686"/>
+          </a:xfrm>
+        </p:spPr>
+        <p:txBody>
+          <a:bodyPr>
+            <a:normAutofit/>
+          </a:bodyPr>
+          <a:lstStyle/>
+          <a:p>
+            <a:r>
+              <a:rPr lang="cs-CZ" sz="2200" dirty="0"/>
+              <a:t>Nedokážu proces popsat.</a:t>
+            </a:r>
+          </a:p>
+          <a:p>
+            <a:r>
+              <a:rPr lang="cs-CZ" sz="2200" dirty="0"/>
+              <a:t>Můžu zadat pouze: jsem těžař </a:t>
+            </a:r>
+            <a:r>
+              <a:rPr lang="cs-CZ" sz="2200" dirty="0" err="1"/>
+              <a:t>bitcoinu</a:t>
+            </a:r>
+            <a:r>
+              <a:rPr lang="cs-CZ" sz="2200" dirty="0"/>
+              <a:t>, jak mi můžeš ty, jako </a:t>
+            </a:r>
+            <a:r>
+              <a:rPr lang="cs-CZ" sz="2200" dirty="0" err="1"/>
+              <a:t>chatGPT</a:t>
+            </a:r>
+            <a:r>
+              <a:rPr lang="cs-CZ" sz="2200" dirty="0"/>
+              <a:t>, zefektivnit život.</a:t>
+            </a:r>
+          </a:p>
+          <a:p>
+            <a:r>
+              <a:rPr lang="cs-CZ" sz="2200" dirty="0"/>
+              <a:t>Obecný dotaz vs. specifický.</a:t>
+            </a:r>
+          </a:p>
+          <a:p>
+            <a:pPr lvl="1"/>
+            <a:r>
+              <a:rPr lang="cs-CZ" sz="2200" dirty="0"/>
+              <a:t>Jak tě můžu využít v nějakém procesu.</a:t>
+            </a:r>
+          </a:p>
+          <a:p>
+            <a:pPr lvl="1"/>
+            <a:r>
+              <a:rPr lang="cs-CZ" sz="2200" dirty="0"/>
+              <a:t>Jak tě můžu využít v procesu, který se skládá z těchto činností.</a:t>
+            </a:r>
+          </a:p>
+          <a:p>
+            <a:endParaRPr lang="cs-CZ" sz="2200" dirty="0"/>
+          </a:p>
+        </p:txBody>
+      </p:sp>
+    </p:spTree>
+    <p:extLst>
+      <p:ext uri="{BB962C8B-B14F-4D97-AF65-F5344CB8AC3E}">
+        <p14:creationId xmlns:p14="http://schemas.microsoft.com/office/powerpoint/2010/main" val="1287356245"/>
+      </p:ext>
+    </p:extLst>
+  </p:cSld>
+  <p:clrMapOvr>
+    <a:masterClrMapping/>
+  </p:clrMapOvr>
+</p:sld>
+</file>
+
+<file path=ppt/slides/slide19.xml><?xml version="1.0" encoding="utf-8"?>
 <p:sld xmlns:a="http://schemas.openxmlformats.org/drawingml/2006/main" xmlns:r="http://schemas.openxmlformats.org/officeDocument/2006/relationships" xmlns:p="http://schemas.openxmlformats.org/presentationml/2006/main">
   <p:cSld>
     <p:bg>
@@ -21168,734 +22958,6 @@
     <p:extLst>
       <p:ext uri="{BB962C8B-B14F-4D97-AF65-F5344CB8AC3E}">
         <p14:creationId xmlns:p14="http://schemas.microsoft.com/office/powerpoint/2010/main" val="449194876"/>
-      </p:ext>
-    </p:extLst>
-  </p:cSld>
-  <p:clrMapOvr>
-    <a:masterClrMapping/>
-  </p:clrMapOvr>
-</p:sld>
-</file>
-
-<file path=ppt/slides/slide17.xml><?xml version="1.0" encoding="utf-8"?>
-<p:sld xmlns:a="http://schemas.openxmlformats.org/drawingml/2006/main" xmlns:r="http://schemas.openxmlformats.org/officeDocument/2006/relationships" xmlns:p="http://schemas.openxmlformats.org/presentationml/2006/main">
-  <p:cSld>
-    <p:spTree>
-      <p:nvGrpSpPr>
-        <p:cNvPr id="1" name=""/>
-        <p:cNvGrpSpPr/>
-        <p:nvPr/>
-      </p:nvGrpSpPr>
-      <p:grpSpPr>
-        <a:xfrm>
-          <a:off x="0" y="0"/>
-          <a:ext cx="0" cy="0"/>
-          <a:chOff x="0" y="0"/>
-          <a:chExt cx="0" cy="0"/>
-        </a:xfrm>
-      </p:grpSpPr>
-      <p:sp>
-        <p:nvSpPr>
-          <p:cNvPr id="2" name="Nadpis 1">
-            <a:extLst>
-              <a:ext uri="{FF2B5EF4-FFF2-40B4-BE49-F238E27FC236}">
-                <a16:creationId xmlns:a16="http://schemas.microsoft.com/office/drawing/2014/main" id="{84EE1761-B830-83A2-0811-861B4773D319}"/>
-              </a:ext>
-            </a:extLst>
-          </p:cNvPr>
-          <p:cNvSpPr>
-            <a:spLocks noGrp="1"/>
-          </p:cNvSpPr>
-          <p:nvPr>
-            <p:ph type="title"/>
-          </p:nvPr>
-        </p:nvSpPr>
-        <p:spPr/>
-        <p:txBody>
-          <a:bodyPr/>
-          <a:lstStyle/>
-          <a:p>
-            <a:r>
-              <a:rPr lang="cs-CZ" dirty="0"/>
-              <a:t>Zajímavosti</a:t>
-            </a:r>
-          </a:p>
-        </p:txBody>
-      </p:sp>
-      <p:sp>
-        <p:nvSpPr>
-          <p:cNvPr id="3" name="Zástupný obsah 2">
-            <a:extLst>
-              <a:ext uri="{FF2B5EF4-FFF2-40B4-BE49-F238E27FC236}">
-                <a16:creationId xmlns:a16="http://schemas.microsoft.com/office/drawing/2014/main" id="{582472B6-7558-3B1A-A38B-6C69389ABBD9}"/>
-              </a:ext>
-            </a:extLst>
-          </p:cNvPr>
-          <p:cNvSpPr>
-            <a:spLocks noGrp="1"/>
-          </p:cNvSpPr>
-          <p:nvPr>
-            <p:ph idx="1"/>
-          </p:nvPr>
-        </p:nvSpPr>
-        <p:spPr/>
-        <p:txBody>
-          <a:bodyPr/>
-          <a:lstStyle/>
-          <a:p>
-            <a:r>
-              <a:rPr lang="cs-CZ" dirty="0" err="1"/>
-              <a:t>Hugginface</a:t>
-            </a:r>
-            <a:r>
-              <a:rPr lang="cs-CZ" dirty="0"/>
-              <a:t> arena</a:t>
-            </a:r>
-          </a:p>
-          <a:p>
-            <a:pPr lvl="1"/>
-            <a:r>
-              <a:rPr lang="en-US" dirty="0">
-                <a:hlinkClick r:id="rId2"/>
-              </a:rPr>
-              <a:t>Chatbot Arena (formerly LMSYS): Free AI Chat to Compare &amp; Test Best AI Chatbots (lmarena.ai)</a:t>
-            </a:r>
-            <a:endParaRPr lang="cs-CZ" dirty="0"/>
-          </a:p>
-          <a:p>
-            <a:pPr lvl="1"/>
-            <a:r>
-              <a:rPr lang="cs-CZ" dirty="0"/>
-              <a:t>Žebříček - </a:t>
-            </a:r>
-            <a:r>
-              <a:rPr lang="en-US" dirty="0">
-                <a:hlinkClick r:id="rId3"/>
-              </a:rPr>
-              <a:t>Chatbot Arena Leaderboard - a Hugging Face Space by </a:t>
-            </a:r>
-            <a:r>
-              <a:rPr lang="en-US" dirty="0" err="1">
-                <a:hlinkClick r:id="rId3"/>
-              </a:rPr>
-              <a:t>lmsys</a:t>
-            </a:r>
-            <a:endParaRPr lang="cs-CZ" dirty="0"/>
-          </a:p>
-          <a:p>
-            <a:r>
-              <a:rPr lang="cs-CZ" dirty="0" err="1"/>
-              <a:t>Hugginface</a:t>
-            </a:r>
-            <a:r>
-              <a:rPr lang="cs-CZ" dirty="0"/>
-              <a:t> – svět otevřených modelů</a:t>
-            </a:r>
-          </a:p>
-          <a:p>
-            <a:pPr lvl="1"/>
-            <a:r>
-              <a:rPr lang="en-US" dirty="0">
-                <a:hlinkClick r:id="rId4"/>
-              </a:rPr>
-              <a:t>Hugging Face – The AI community building the future.</a:t>
-            </a:r>
-            <a:endParaRPr lang="cs-CZ" dirty="0"/>
-          </a:p>
-          <a:p>
-            <a:r>
-              <a:rPr lang="cs-CZ" dirty="0"/>
-              <a:t>Multiagentní systémy – automatizace komplexních procesů</a:t>
-            </a:r>
-          </a:p>
-          <a:p>
-            <a:pPr lvl="1"/>
-            <a:r>
-              <a:rPr lang="cs-CZ" dirty="0" err="1">
-                <a:hlinkClick r:id="rId5"/>
-              </a:rPr>
-              <a:t>LangGraph</a:t>
-            </a:r>
-            <a:r>
-              <a:rPr lang="cs-CZ" dirty="0">
-                <a:hlinkClick r:id="rId5"/>
-              </a:rPr>
-              <a:t> (langchain.com)</a:t>
-            </a:r>
-            <a:endParaRPr lang="cs-CZ" dirty="0"/>
-          </a:p>
-        </p:txBody>
-      </p:sp>
-    </p:spTree>
-    <p:extLst>
-      <p:ext uri="{BB962C8B-B14F-4D97-AF65-F5344CB8AC3E}">
-        <p14:creationId xmlns:p14="http://schemas.microsoft.com/office/powerpoint/2010/main" val="1021013197"/>
-      </p:ext>
-    </p:extLst>
-  </p:cSld>
-  <p:clrMapOvr>
-    <a:masterClrMapping/>
-  </p:clrMapOvr>
-</p:sld>
-</file>
-
-<file path=ppt/slides/slide18.xml><?xml version="1.0" encoding="utf-8"?>
-<p:sld xmlns:a="http://schemas.openxmlformats.org/drawingml/2006/main" xmlns:r="http://schemas.openxmlformats.org/officeDocument/2006/relationships" xmlns:p="http://schemas.openxmlformats.org/presentationml/2006/main">
-  <p:cSld>
-    <p:bg>
-      <p:bgPr>
-        <a:solidFill>
-          <a:schemeClr val="bg1"/>
-        </a:solidFill>
-        <a:effectLst/>
-      </p:bgPr>
-    </p:bg>
-    <p:spTree>
-      <p:nvGrpSpPr>
-        <p:cNvPr id="1" name=""/>
-        <p:cNvGrpSpPr/>
-        <p:nvPr/>
-      </p:nvGrpSpPr>
-      <p:grpSpPr>
-        <a:xfrm>
-          <a:off x="0" y="0"/>
-          <a:ext cx="0" cy="0"/>
-          <a:chOff x="0" y="0"/>
-          <a:chExt cx="0" cy="0"/>
-        </a:xfrm>
-      </p:grpSpPr>
-      <p:sp useBgFill="1">
-        <p:nvSpPr>
-          <p:cNvPr id="8" name="Rectangle 7">
-            <a:extLst>
-              <a:ext uri="{FF2B5EF4-FFF2-40B4-BE49-F238E27FC236}">
-                <a16:creationId xmlns:a16="http://schemas.microsoft.com/office/drawing/2014/main" id="{943CAA20-3569-4189-9E48-239A229A86CA}"/>
-              </a:ext>
-              <a:ext uri="{C183D7F6-B498-43B3-948B-1728B52AA6E4}">
-                <adec:decorative xmlns:adec="http://schemas.microsoft.com/office/drawing/2017/decorative" val="1"/>
-              </a:ext>
-            </a:extLst>
-          </p:cNvPr>
-          <p:cNvSpPr>
-            <a:spLocks noGrp="1" noRot="1" noChangeAspect="1" noMove="1" noResize="1" noEditPoints="1" noAdjustHandles="1" noChangeArrowheads="1" noChangeShapeType="1" noTextEdit="1"/>
-          </p:cNvSpPr>
-          <p:nvPr>
-            <p:extLst>
-              <p:ext uri="{386F3935-93C4-4BCD-93E2-E3B085C9AB24}">
-                <p16:designElem xmlns:p16="http://schemas.microsoft.com/office/powerpoint/2015/main" val="1"/>
-              </p:ext>
-            </p:extLst>
-          </p:nvPr>
-        </p:nvSpPr>
-        <p:spPr>
-          <a:xfrm>
-            <a:off x="0" y="0"/>
-            <a:ext cx="12188952" cy="6858000"/>
-          </a:xfrm>
-          <a:prstGeom prst="rect">
-            <a:avLst/>
-          </a:prstGeom>
-          <a:ln>
-            <a:noFill/>
-          </a:ln>
-        </p:spPr>
-        <p:style>
-          <a:lnRef idx="2">
-            <a:schemeClr val="accent1">
-              <a:shade val="50000"/>
-            </a:schemeClr>
-          </a:lnRef>
-          <a:fillRef idx="1">
-            <a:schemeClr val="accent1"/>
-          </a:fillRef>
-          <a:effectRef idx="0">
-            <a:schemeClr val="accent1"/>
-          </a:effectRef>
-          <a:fontRef idx="minor">
-            <a:schemeClr val="lt1"/>
-          </a:fontRef>
-        </p:style>
-        <p:txBody>
-          <a:bodyPr rtlCol="0" anchor="ctr"/>
-          <a:lstStyle/>
-          <a:p>
-            <a:pPr algn="ctr"/>
-            <a:endParaRPr lang="en-US"/>
-          </a:p>
-        </p:txBody>
-      </p:sp>
-      <p:sp>
-        <p:nvSpPr>
-          <p:cNvPr id="2" name="Nadpis 1">
-            <a:extLst>
-              <a:ext uri="{FF2B5EF4-FFF2-40B4-BE49-F238E27FC236}">
-                <a16:creationId xmlns:a16="http://schemas.microsoft.com/office/drawing/2014/main" id="{B788061E-437A-59B2-D5E7-6AC941DE299A}"/>
-              </a:ext>
-            </a:extLst>
-          </p:cNvPr>
-          <p:cNvSpPr>
-            <a:spLocks noGrp="1"/>
-          </p:cNvSpPr>
-          <p:nvPr>
-            <p:ph type="title"/>
-          </p:nvPr>
-        </p:nvSpPr>
-        <p:spPr>
-          <a:xfrm>
-            <a:off x="838200" y="451381"/>
-            <a:ext cx="10512552" cy="4066540"/>
-          </a:xfrm>
-        </p:spPr>
-        <p:txBody>
-          <a:bodyPr vert="horz" lIns="91440" tIns="45720" rIns="91440" bIns="45720" rtlCol="0" anchor="b">
-            <a:normAutofit/>
-          </a:bodyPr>
-          <a:lstStyle/>
-          <a:p>
-            <a:r>
-              <a:rPr lang="cs-CZ" sz="6600" kern="1200" dirty="0">
-                <a:solidFill>
-                  <a:schemeClr val="tx1"/>
-                </a:solidFill>
-                <a:latin typeface="+mj-lt"/>
-                <a:ea typeface="+mj-ea"/>
-                <a:cs typeface="+mj-cs"/>
-              </a:rPr>
-              <a:t>Otázky či diskuze</a:t>
-            </a:r>
-            <a:endParaRPr lang="en-US" sz="6600" kern="1200" dirty="0">
-              <a:solidFill>
-                <a:schemeClr val="tx1"/>
-              </a:solidFill>
-              <a:latin typeface="+mj-lt"/>
-              <a:ea typeface="+mj-ea"/>
-              <a:cs typeface="+mj-cs"/>
-            </a:endParaRPr>
-          </a:p>
-        </p:txBody>
-      </p:sp>
-      <p:sp>
-        <p:nvSpPr>
-          <p:cNvPr id="3" name="Zástupný obsah 2">
-            <a:extLst>
-              <a:ext uri="{FF2B5EF4-FFF2-40B4-BE49-F238E27FC236}">
-                <a16:creationId xmlns:a16="http://schemas.microsoft.com/office/drawing/2014/main" id="{B943F876-DF9E-B4B3-86AA-E82FA2E926DF}"/>
-              </a:ext>
-            </a:extLst>
-          </p:cNvPr>
-          <p:cNvSpPr>
-            <a:spLocks noGrp="1"/>
-          </p:cNvSpPr>
-          <p:nvPr>
-            <p:ph idx="1"/>
-          </p:nvPr>
-        </p:nvSpPr>
-        <p:spPr>
-          <a:xfrm>
-            <a:off x="838199" y="4983276"/>
-            <a:ext cx="10512552" cy="1126680"/>
-          </a:xfrm>
-        </p:spPr>
-        <p:txBody>
-          <a:bodyPr vert="horz" lIns="91440" tIns="45720" rIns="91440" bIns="45720" rtlCol="0">
-            <a:normAutofit/>
-          </a:bodyPr>
-          <a:lstStyle/>
-          <a:p>
-            <a:pPr marL="0" indent="0">
-              <a:buNone/>
-            </a:pPr>
-            <a:r>
-              <a:rPr lang="en-US" sz="2400" kern="1200">
-                <a:solidFill>
-                  <a:schemeClr val="tx1"/>
-                </a:solidFill>
-                <a:latin typeface="+mn-lt"/>
-                <a:ea typeface="+mn-ea"/>
-                <a:cs typeface="+mn-cs"/>
-              </a:rPr>
-              <a:t>Díky za pozornost</a:t>
-            </a:r>
-          </a:p>
-        </p:txBody>
-      </p:sp>
-      <p:sp>
-        <p:nvSpPr>
-          <p:cNvPr id="10" name="sketch line">
-            <a:extLst>
-              <a:ext uri="{FF2B5EF4-FFF2-40B4-BE49-F238E27FC236}">
-                <a16:creationId xmlns:a16="http://schemas.microsoft.com/office/drawing/2014/main" id="{DA542B6D-E775-4832-91DC-2D20F857813A}"/>
-              </a:ext>
-              <a:ext uri="{C183D7F6-B498-43B3-948B-1728B52AA6E4}">
-                <adec:decorative xmlns:adec="http://schemas.microsoft.com/office/drawing/2017/decorative" val="1"/>
-              </a:ext>
-            </a:extLst>
-          </p:cNvPr>
-          <p:cNvSpPr>
-            <a:spLocks noGrp="1" noRot="1" noChangeAspect="1" noMove="1" noResize="1" noEditPoints="1" noAdjustHandles="1" noChangeArrowheads="1" noChangeShapeType="1" noTextEdit="1"/>
-          </p:cNvSpPr>
-          <p:nvPr>
-            <p:extLst>
-              <p:ext uri="{386F3935-93C4-4BCD-93E2-E3B085C9AB24}">
-                <p16:designElem xmlns:p16="http://schemas.microsoft.com/office/powerpoint/2015/main" val="1"/>
-              </p:ext>
-            </p:extLst>
-          </p:nvPr>
-        </p:nvSpPr>
-        <p:spPr>
-          <a:xfrm>
-            <a:off x="838200" y="4718595"/>
-            <a:ext cx="5410200" cy="18288"/>
-          </a:xfrm>
-          <a:custGeom>
-            <a:avLst/>
-            <a:gdLst>
-              <a:gd name="connsiteX0" fmla="*/ 0 w 5410200"/>
-              <a:gd name="connsiteY0" fmla="*/ 0 h 18288"/>
-              <a:gd name="connsiteX1" fmla="*/ 568071 w 5410200"/>
-              <a:gd name="connsiteY1" fmla="*/ 0 h 18288"/>
-              <a:gd name="connsiteX2" fmla="*/ 1298448 w 5410200"/>
-              <a:gd name="connsiteY2" fmla="*/ 0 h 18288"/>
-              <a:gd name="connsiteX3" fmla="*/ 1920621 w 5410200"/>
-              <a:gd name="connsiteY3" fmla="*/ 0 h 18288"/>
-              <a:gd name="connsiteX4" fmla="*/ 2488692 w 5410200"/>
-              <a:gd name="connsiteY4" fmla="*/ 0 h 18288"/>
-              <a:gd name="connsiteX5" fmla="*/ 3219069 w 5410200"/>
-              <a:gd name="connsiteY5" fmla="*/ 0 h 18288"/>
-              <a:gd name="connsiteX6" fmla="*/ 3895344 w 5410200"/>
-              <a:gd name="connsiteY6" fmla="*/ 0 h 18288"/>
-              <a:gd name="connsiteX7" fmla="*/ 4571619 w 5410200"/>
-              <a:gd name="connsiteY7" fmla="*/ 0 h 18288"/>
-              <a:gd name="connsiteX8" fmla="*/ 5410200 w 5410200"/>
-              <a:gd name="connsiteY8" fmla="*/ 0 h 18288"/>
-              <a:gd name="connsiteX9" fmla="*/ 5410200 w 5410200"/>
-              <a:gd name="connsiteY9" fmla="*/ 18288 h 18288"/>
-              <a:gd name="connsiteX10" fmla="*/ 4842129 w 5410200"/>
-              <a:gd name="connsiteY10" fmla="*/ 18288 h 18288"/>
-              <a:gd name="connsiteX11" fmla="*/ 4328160 w 5410200"/>
-              <a:gd name="connsiteY11" fmla="*/ 18288 h 18288"/>
-              <a:gd name="connsiteX12" fmla="*/ 3597783 w 5410200"/>
-              <a:gd name="connsiteY12" fmla="*/ 18288 h 18288"/>
-              <a:gd name="connsiteX13" fmla="*/ 3029712 w 5410200"/>
-              <a:gd name="connsiteY13" fmla="*/ 18288 h 18288"/>
-              <a:gd name="connsiteX14" fmla="*/ 2299335 w 5410200"/>
-              <a:gd name="connsiteY14" fmla="*/ 18288 h 18288"/>
-              <a:gd name="connsiteX15" fmla="*/ 1514856 w 5410200"/>
-              <a:gd name="connsiteY15" fmla="*/ 18288 h 18288"/>
-              <a:gd name="connsiteX16" fmla="*/ 892683 w 5410200"/>
-              <a:gd name="connsiteY16" fmla="*/ 18288 h 18288"/>
-              <a:gd name="connsiteX17" fmla="*/ 0 w 5410200"/>
-              <a:gd name="connsiteY17" fmla="*/ 18288 h 18288"/>
-              <a:gd name="connsiteX18" fmla="*/ 0 w 5410200"/>
-              <a:gd name="connsiteY18" fmla="*/ 0 h 18288"/>
-            </a:gdLst>
-            <a:ahLst/>
-            <a:cxnLst>
-              <a:cxn ang="0">
-                <a:pos x="connsiteX0" y="connsiteY0"/>
-              </a:cxn>
-              <a:cxn ang="0">
-                <a:pos x="connsiteX1" y="connsiteY1"/>
-              </a:cxn>
-              <a:cxn ang="0">
-                <a:pos x="connsiteX2" y="connsiteY2"/>
-              </a:cxn>
-              <a:cxn ang="0">
-                <a:pos x="connsiteX3" y="connsiteY3"/>
-              </a:cxn>
-              <a:cxn ang="0">
-                <a:pos x="connsiteX4" y="connsiteY4"/>
-              </a:cxn>
-              <a:cxn ang="0">
-                <a:pos x="connsiteX5" y="connsiteY5"/>
-              </a:cxn>
-              <a:cxn ang="0">
-                <a:pos x="connsiteX6" y="connsiteY6"/>
-              </a:cxn>
-              <a:cxn ang="0">
-                <a:pos x="connsiteX7" y="connsiteY7"/>
-              </a:cxn>
-              <a:cxn ang="0">
-                <a:pos x="connsiteX8" y="connsiteY8"/>
-              </a:cxn>
-              <a:cxn ang="0">
-                <a:pos x="connsiteX9" y="connsiteY9"/>
-              </a:cxn>
-              <a:cxn ang="0">
-                <a:pos x="connsiteX10" y="connsiteY10"/>
-              </a:cxn>
-              <a:cxn ang="0">
-                <a:pos x="connsiteX11" y="connsiteY11"/>
-              </a:cxn>
-              <a:cxn ang="0">
-                <a:pos x="connsiteX12" y="connsiteY12"/>
-              </a:cxn>
-              <a:cxn ang="0">
-                <a:pos x="connsiteX13" y="connsiteY13"/>
-              </a:cxn>
-              <a:cxn ang="0">
-                <a:pos x="connsiteX14" y="connsiteY14"/>
-              </a:cxn>
-              <a:cxn ang="0">
-                <a:pos x="connsiteX15" y="connsiteY15"/>
-              </a:cxn>
-              <a:cxn ang="0">
-                <a:pos x="connsiteX16" y="connsiteY16"/>
-              </a:cxn>
-              <a:cxn ang="0">
-                <a:pos x="connsiteX17" y="connsiteY17"/>
-              </a:cxn>
-              <a:cxn ang="0">
-                <a:pos x="connsiteX18" y="connsiteY18"/>
-              </a:cxn>
-            </a:cxnLst>
-            <a:rect l="l" t="t" r="r" b="b"/>
-            <a:pathLst>
-              <a:path w="5410200" h="18288" fill="none" extrusionOk="0">
-                <a:moveTo>
-                  <a:pt x="0" y="0"/>
-                </a:moveTo>
-                <a:cubicBezTo>
-                  <a:pt x="163050" y="-18707"/>
-                  <a:pt x="319321" y="-16364"/>
-                  <a:pt x="568071" y="0"/>
-                </a:cubicBezTo>
-                <a:cubicBezTo>
-                  <a:pt x="816821" y="16364"/>
-                  <a:pt x="1013224" y="-7268"/>
-                  <a:pt x="1298448" y="0"/>
-                </a:cubicBezTo>
-                <a:cubicBezTo>
-                  <a:pt x="1583672" y="7268"/>
-                  <a:pt x="1631711" y="-3367"/>
-                  <a:pt x="1920621" y="0"/>
-                </a:cubicBezTo>
-                <a:cubicBezTo>
-                  <a:pt x="2209531" y="3367"/>
-                  <a:pt x="2364420" y="-19184"/>
-                  <a:pt x="2488692" y="0"/>
-                </a:cubicBezTo>
-                <a:cubicBezTo>
-                  <a:pt x="2612964" y="19184"/>
-                  <a:pt x="3023298" y="-34627"/>
-                  <a:pt x="3219069" y="0"/>
-                </a:cubicBezTo>
-                <a:cubicBezTo>
-                  <a:pt x="3414840" y="34627"/>
-                  <a:pt x="3656810" y="24043"/>
-                  <a:pt x="3895344" y="0"/>
-                </a:cubicBezTo>
-                <a:cubicBezTo>
-                  <a:pt x="4133879" y="-24043"/>
-                  <a:pt x="4393984" y="-19577"/>
-                  <a:pt x="4571619" y="0"/>
-                </a:cubicBezTo>
-                <a:cubicBezTo>
-                  <a:pt x="4749255" y="19577"/>
-                  <a:pt x="5179928" y="-6281"/>
-                  <a:pt x="5410200" y="0"/>
-                </a:cubicBezTo>
-                <a:cubicBezTo>
-                  <a:pt x="5410730" y="6954"/>
-                  <a:pt x="5410934" y="12839"/>
-                  <a:pt x="5410200" y="18288"/>
-                </a:cubicBezTo>
-                <a:cubicBezTo>
-                  <a:pt x="5139060" y="6751"/>
-                  <a:pt x="5121593" y="31035"/>
-                  <a:pt x="4842129" y="18288"/>
-                </a:cubicBezTo>
-                <a:cubicBezTo>
-                  <a:pt x="4562665" y="5541"/>
-                  <a:pt x="4448273" y="9487"/>
-                  <a:pt x="4328160" y="18288"/>
-                </a:cubicBezTo>
-                <a:cubicBezTo>
-                  <a:pt x="4208047" y="27089"/>
-                  <a:pt x="3760936" y="22567"/>
-                  <a:pt x="3597783" y="18288"/>
-                </a:cubicBezTo>
-                <a:cubicBezTo>
-                  <a:pt x="3434630" y="14009"/>
-                  <a:pt x="3299718" y="33213"/>
-                  <a:pt x="3029712" y="18288"/>
-                </a:cubicBezTo>
-                <a:cubicBezTo>
-                  <a:pt x="2759706" y="3363"/>
-                  <a:pt x="2640159" y="27394"/>
-                  <a:pt x="2299335" y="18288"/>
-                </a:cubicBezTo>
-                <a:cubicBezTo>
-                  <a:pt x="1958511" y="9182"/>
-                  <a:pt x="1801186" y="28985"/>
-                  <a:pt x="1514856" y="18288"/>
-                </a:cubicBezTo>
-                <a:cubicBezTo>
-                  <a:pt x="1228526" y="7591"/>
-                  <a:pt x="1063509" y="-5305"/>
-                  <a:pt x="892683" y="18288"/>
-                </a:cubicBezTo>
-                <a:cubicBezTo>
-                  <a:pt x="721857" y="41881"/>
-                  <a:pt x="186945" y="-20897"/>
-                  <a:pt x="0" y="18288"/>
-                </a:cubicBezTo>
-                <a:cubicBezTo>
-                  <a:pt x="-570" y="9279"/>
-                  <a:pt x="132" y="5100"/>
-                  <a:pt x="0" y="0"/>
-                </a:cubicBezTo>
-                <a:close/>
-              </a:path>
-              <a:path w="5410200" h="18288" stroke="0" extrusionOk="0">
-                <a:moveTo>
-                  <a:pt x="0" y="0"/>
-                </a:moveTo>
-                <a:cubicBezTo>
-                  <a:pt x="285096" y="-4925"/>
-                  <a:pt x="376456" y="22268"/>
-                  <a:pt x="622173" y="0"/>
-                </a:cubicBezTo>
-                <a:cubicBezTo>
-                  <a:pt x="867890" y="-22268"/>
-                  <a:pt x="1031392" y="7228"/>
-                  <a:pt x="1136142" y="0"/>
-                </a:cubicBezTo>
-                <a:cubicBezTo>
-                  <a:pt x="1240892" y="-7228"/>
-                  <a:pt x="1561853" y="9877"/>
-                  <a:pt x="1920621" y="0"/>
-                </a:cubicBezTo>
-                <a:cubicBezTo>
-                  <a:pt x="2279389" y="-9877"/>
-                  <a:pt x="2367255" y="19546"/>
-                  <a:pt x="2542794" y="0"/>
-                </a:cubicBezTo>
-                <a:cubicBezTo>
-                  <a:pt x="2718333" y="-19546"/>
-                  <a:pt x="2866732" y="-22226"/>
-                  <a:pt x="3164967" y="0"/>
-                </a:cubicBezTo>
-                <a:cubicBezTo>
-                  <a:pt x="3463202" y="22226"/>
-                  <a:pt x="3568055" y="-2765"/>
-                  <a:pt x="3949446" y="0"/>
-                </a:cubicBezTo>
-                <a:cubicBezTo>
-                  <a:pt x="4330837" y="2765"/>
-                  <a:pt x="4287895" y="10557"/>
-                  <a:pt x="4517517" y="0"/>
-                </a:cubicBezTo>
-                <a:cubicBezTo>
-                  <a:pt x="4747139" y="-10557"/>
-                  <a:pt x="5149588" y="8716"/>
-                  <a:pt x="5410200" y="0"/>
-                </a:cubicBezTo>
-                <a:cubicBezTo>
-                  <a:pt x="5409517" y="5414"/>
-                  <a:pt x="5409480" y="12510"/>
-                  <a:pt x="5410200" y="18288"/>
-                </a:cubicBezTo>
-                <a:cubicBezTo>
-                  <a:pt x="5163327" y="41494"/>
-                  <a:pt x="5008749" y="10693"/>
-                  <a:pt x="4842129" y="18288"/>
-                </a:cubicBezTo>
-                <a:cubicBezTo>
-                  <a:pt x="4675509" y="25883"/>
-                  <a:pt x="4433401" y="-615"/>
-                  <a:pt x="4165854" y="18288"/>
-                </a:cubicBezTo>
-                <a:cubicBezTo>
-                  <a:pt x="3898308" y="37191"/>
-                  <a:pt x="3809032" y="-8710"/>
-                  <a:pt x="3543681" y="18288"/>
-                </a:cubicBezTo>
-                <a:cubicBezTo>
-                  <a:pt x="3278330" y="45286"/>
-                  <a:pt x="3073876" y="-15917"/>
-                  <a:pt x="2759202" y="18288"/>
-                </a:cubicBezTo>
-                <a:cubicBezTo>
-                  <a:pt x="2444528" y="52493"/>
-                  <a:pt x="2204144" y="3372"/>
-                  <a:pt x="1974723" y="18288"/>
-                </a:cubicBezTo>
-                <a:cubicBezTo>
-                  <a:pt x="1745302" y="33204"/>
-                  <a:pt x="1602335" y="31490"/>
-                  <a:pt x="1406652" y="18288"/>
-                </a:cubicBezTo>
-                <a:cubicBezTo>
-                  <a:pt x="1210969" y="5086"/>
-                  <a:pt x="923948" y="3161"/>
-                  <a:pt x="730377" y="18288"/>
-                </a:cubicBezTo>
-                <a:cubicBezTo>
-                  <a:pt x="536806" y="33415"/>
-                  <a:pt x="336496" y="-141"/>
-                  <a:pt x="0" y="18288"/>
-                </a:cubicBezTo>
-                <a:cubicBezTo>
-                  <a:pt x="-306" y="11061"/>
-                  <a:pt x="-655" y="7751"/>
-                  <a:pt x="0" y="0"/>
-                </a:cubicBezTo>
-                <a:close/>
-              </a:path>
-            </a:pathLst>
-          </a:custGeom>
-          <a:solidFill>
-            <a:schemeClr val="accent2"/>
-          </a:solidFill>
-          <a:ln w="41275" cap="rnd">
-            <a:solidFill>
-              <a:schemeClr val="accent2"/>
-            </a:solidFill>
-            <a:round/>
-            <a:extLst>
-              <a:ext uri="{C807C97D-BFC1-408E-A445-0C87EB9F89A2}">
-                <ask:lineSketchStyleProps xmlns:ask="http://schemas.microsoft.com/office/drawing/2018/sketchyshapes" sd="1219033472">
-                  <a:prstGeom prst="rect">
-                    <a:avLst/>
-                  </a:prstGeom>
-                  <ask:type>
-                    <ask:lineSketchFreehand/>
-                  </ask:type>
-                </ask:lineSketchStyleProps>
-              </a:ext>
-            </a:extLst>
-          </a:ln>
-        </p:spPr>
-        <p:style>
-          <a:lnRef idx="2">
-            <a:schemeClr val="accent1">
-              <a:shade val="50000"/>
-            </a:schemeClr>
-          </a:lnRef>
-          <a:fillRef idx="1">
-            <a:schemeClr val="accent1"/>
-          </a:fillRef>
-          <a:effectRef idx="0">
-            <a:schemeClr val="accent1"/>
-          </a:effectRef>
-          <a:fontRef idx="minor">
-            <a:schemeClr val="lt1"/>
-          </a:fontRef>
-        </p:style>
-        <p:txBody>
-          <a:bodyPr rtlCol="0" anchor="ctr"/>
-          <a:lstStyle/>
-          <a:p>
-            <a:pPr algn="ctr"/>
-            <a:endParaRPr lang="en-US"/>
-          </a:p>
-        </p:txBody>
-      </p:sp>
-    </p:spTree>
-    <p:extLst>
-      <p:ext uri="{BB962C8B-B14F-4D97-AF65-F5344CB8AC3E}">
-        <p14:creationId xmlns:p14="http://schemas.microsoft.com/office/powerpoint/2010/main" val="1380641108"/>
       </p:ext>
     </p:extLst>
   </p:cSld>
@@ -22507,6 +23569,933 @@
       <p:bldP spid="2" grpId="0"/>
     </p:bldLst>
   </p:timing>
+</p:sld>
+</file>
+
+<file path=ppt/slides/slide20.xml><?xml version="1.0" encoding="utf-8"?>
+<p:sld xmlns:a="http://schemas.openxmlformats.org/drawingml/2006/main" xmlns:r="http://schemas.openxmlformats.org/officeDocument/2006/relationships" xmlns:p="http://schemas.openxmlformats.org/presentationml/2006/main">
+  <p:cSld>
+    <p:bg>
+      <p:bgPr>
+        <a:solidFill>
+          <a:schemeClr val="bg1"/>
+        </a:solidFill>
+        <a:effectLst/>
+      </p:bgPr>
+    </p:bg>
+    <p:spTree>
+      <p:nvGrpSpPr>
+        <p:cNvPr id="1" name=""/>
+        <p:cNvGrpSpPr/>
+        <p:nvPr/>
+      </p:nvGrpSpPr>
+      <p:grpSpPr>
+        <a:xfrm>
+          <a:off x="0" y="0"/>
+          <a:ext cx="0" cy="0"/>
+          <a:chOff x="0" y="0"/>
+          <a:chExt cx="0" cy="0"/>
+        </a:xfrm>
+      </p:grpSpPr>
+      <p:sp useBgFill="1">
+        <p:nvSpPr>
+          <p:cNvPr id="8" name="Rectangle 7">
+            <a:extLst>
+              <a:ext uri="{FF2B5EF4-FFF2-40B4-BE49-F238E27FC236}">
+                <a16:creationId xmlns:a16="http://schemas.microsoft.com/office/drawing/2014/main" id="{CBB2B1F0-0DD6-4744-9A46-7A344FB48E40}"/>
+              </a:ext>
+              <a:ext uri="{C183D7F6-B498-43B3-948B-1728B52AA6E4}">
+                <adec:decorative xmlns:adec="http://schemas.microsoft.com/office/drawing/2017/decorative" val="1"/>
+              </a:ext>
+            </a:extLst>
+          </p:cNvPr>
+          <p:cNvSpPr>
+            <a:spLocks noGrp="1" noRot="1" noChangeAspect="1" noMove="1" noResize="1" noEditPoints="1" noAdjustHandles="1" noChangeArrowheads="1" noChangeShapeType="1" noTextEdit="1"/>
+          </p:cNvSpPr>
+          <p:nvPr>
+            <p:extLst>
+              <p:ext uri="{386F3935-93C4-4BCD-93E2-E3B085C9AB24}">
+                <p16:designElem xmlns:p16="http://schemas.microsoft.com/office/powerpoint/2015/main" val="1"/>
+              </p:ext>
+            </p:extLst>
+          </p:nvPr>
+        </p:nvSpPr>
+        <p:spPr>
+          <a:xfrm>
+            <a:off x="0" y="0"/>
+            <a:ext cx="12192000" cy="6858000"/>
+          </a:xfrm>
+          <a:prstGeom prst="rect">
+            <a:avLst/>
+          </a:prstGeom>
+          <a:ln>
+            <a:noFill/>
+          </a:ln>
+        </p:spPr>
+        <p:style>
+          <a:lnRef idx="2">
+            <a:schemeClr val="accent1">
+              <a:shade val="50000"/>
+            </a:schemeClr>
+          </a:lnRef>
+          <a:fillRef idx="1">
+            <a:schemeClr val="accent1"/>
+          </a:fillRef>
+          <a:effectRef idx="0">
+            <a:schemeClr val="accent1"/>
+          </a:effectRef>
+          <a:fontRef idx="minor">
+            <a:schemeClr val="lt1"/>
+          </a:fontRef>
+        </p:style>
+        <p:txBody>
+          <a:bodyPr rtlCol="0" anchor="ctr"/>
+          <a:lstStyle/>
+          <a:p>
+            <a:pPr algn="ctr"/>
+            <a:endParaRPr lang="en-US"/>
+          </a:p>
+        </p:txBody>
+      </p:sp>
+      <p:sp>
+        <p:nvSpPr>
+          <p:cNvPr id="2" name="Nadpis 1">
+            <a:extLst>
+              <a:ext uri="{FF2B5EF4-FFF2-40B4-BE49-F238E27FC236}">
+                <a16:creationId xmlns:a16="http://schemas.microsoft.com/office/drawing/2014/main" id="{84EE1761-B830-83A2-0811-861B4773D319}"/>
+              </a:ext>
+            </a:extLst>
+          </p:cNvPr>
+          <p:cNvSpPr>
+            <a:spLocks noGrp="1"/>
+          </p:cNvSpPr>
+          <p:nvPr>
+            <p:ph type="title"/>
+          </p:nvPr>
+        </p:nvSpPr>
+        <p:spPr>
+          <a:xfrm>
+            <a:off x="841248" y="426720"/>
+            <a:ext cx="10506456" cy="1919141"/>
+          </a:xfrm>
+        </p:spPr>
+        <p:txBody>
+          <a:bodyPr anchor="b">
+            <a:normAutofit/>
+          </a:bodyPr>
+          <a:lstStyle/>
+          <a:p>
+            <a:r>
+              <a:rPr lang="cs-CZ" sz="6000"/>
+              <a:t>Zajímavosti</a:t>
+            </a:r>
+          </a:p>
+        </p:txBody>
+      </p:sp>
+      <p:sp>
+        <p:nvSpPr>
+          <p:cNvPr id="10" name="Rectangle 9">
+            <a:extLst>
+              <a:ext uri="{FF2B5EF4-FFF2-40B4-BE49-F238E27FC236}">
+                <a16:creationId xmlns:a16="http://schemas.microsoft.com/office/drawing/2014/main" id="{52D502E5-F6B4-4D58-B4AE-FC466FF15EE8}"/>
+              </a:ext>
+              <a:ext uri="{C183D7F6-B498-43B3-948B-1728B52AA6E4}">
+                <adec:decorative xmlns:adec="http://schemas.microsoft.com/office/drawing/2017/decorative" val="1"/>
+              </a:ext>
+            </a:extLst>
+          </p:cNvPr>
+          <p:cNvSpPr>
+            <a:spLocks noGrp="1" noRot="1" noChangeAspect="1" noMove="1" noResize="1" noEditPoints="1" noAdjustHandles="1" noChangeArrowheads="1" noChangeShapeType="1" noTextEdit="1"/>
+          </p:cNvSpPr>
+          <p:nvPr>
+            <p:extLst>
+              <p:ext uri="{386F3935-93C4-4BCD-93E2-E3B085C9AB24}">
+                <p16:designElem xmlns:p16="http://schemas.microsoft.com/office/powerpoint/2015/main" val="1"/>
+              </p:ext>
+            </p:extLst>
+          </p:nvPr>
+        </p:nvSpPr>
+        <p:spPr>
+          <a:xfrm>
+            <a:off x="865953" y="2899927"/>
+            <a:ext cx="10451592" cy="18288"/>
+          </a:xfrm>
+          <a:prstGeom prst="rect">
+            <a:avLst/>
+          </a:prstGeom>
+          <a:solidFill>
+            <a:srgbClr val="D5D5D5"/>
+          </a:solidFill>
+          <a:ln w="3175">
+            <a:noFill/>
+          </a:ln>
+          <a:effectLst/>
+        </p:spPr>
+        <p:style>
+          <a:lnRef idx="2">
+            <a:schemeClr val="accent1">
+              <a:shade val="50000"/>
+            </a:schemeClr>
+          </a:lnRef>
+          <a:fillRef idx="1">
+            <a:schemeClr val="accent1"/>
+          </a:fillRef>
+          <a:effectRef idx="0">
+            <a:schemeClr val="accent1"/>
+          </a:effectRef>
+          <a:fontRef idx="minor">
+            <a:schemeClr val="lt1"/>
+          </a:fontRef>
+        </p:style>
+        <p:txBody>
+          <a:bodyPr rtlCol="0" anchor="ctr"/>
+          <a:lstStyle/>
+          <a:p>
+            <a:pPr algn="ctr"/>
+            <a:endParaRPr lang="en-US">
+              <a:solidFill>
+                <a:prstClr val="white"/>
+              </a:solidFill>
+              <a:latin typeface="Calibri" panose="020F0502020204030204"/>
+            </a:endParaRPr>
+          </a:p>
+        </p:txBody>
+      </p:sp>
+      <p:sp>
+        <p:nvSpPr>
+          <p:cNvPr id="12" name="Rectangle 11">
+            <a:extLst>
+              <a:ext uri="{FF2B5EF4-FFF2-40B4-BE49-F238E27FC236}">
+                <a16:creationId xmlns:a16="http://schemas.microsoft.com/office/drawing/2014/main" id="{9DECDBF4-02B6-4BB4-B65B-B8107AD6A9E8}"/>
+              </a:ext>
+              <a:ext uri="{C183D7F6-B498-43B3-948B-1728B52AA6E4}">
+                <adec:decorative xmlns:adec="http://schemas.microsoft.com/office/drawing/2017/decorative" val="1"/>
+              </a:ext>
+            </a:extLst>
+          </p:cNvPr>
+          <p:cNvSpPr>
+            <a:spLocks noGrp="1" noRot="1" noChangeAspect="1" noMove="1" noResize="1" noEditPoints="1" noAdjustHandles="1" noChangeArrowheads="1" noChangeShapeType="1" noTextEdit="1"/>
+          </p:cNvSpPr>
+          <p:nvPr>
+            <p:extLst>
+              <p:ext uri="{386F3935-93C4-4BCD-93E2-E3B085C9AB24}">
+                <p16:designElem xmlns:p16="http://schemas.microsoft.com/office/powerpoint/2015/main" val="1"/>
+              </p:ext>
+            </p:extLst>
+          </p:nvPr>
+        </p:nvSpPr>
+        <p:spPr>
+          <a:xfrm flipV="1">
+            <a:off x="841248" y="2776031"/>
+            <a:ext cx="1873457" cy="137160"/>
+          </a:xfrm>
+          <a:prstGeom prst="rect">
+            <a:avLst/>
+          </a:prstGeom>
+          <a:solidFill>
+            <a:schemeClr val="accent2"/>
+          </a:solidFill>
+          <a:ln>
+            <a:noFill/>
+          </a:ln>
+        </p:spPr>
+        <p:style>
+          <a:lnRef idx="2">
+            <a:schemeClr val="accent1">
+              <a:shade val="50000"/>
+            </a:schemeClr>
+          </a:lnRef>
+          <a:fillRef idx="1">
+            <a:schemeClr val="accent1"/>
+          </a:fillRef>
+          <a:effectRef idx="0">
+            <a:schemeClr val="accent1"/>
+          </a:effectRef>
+          <a:fontRef idx="minor">
+            <a:schemeClr val="lt1"/>
+          </a:fontRef>
+        </p:style>
+        <p:txBody>
+          <a:bodyPr rtlCol="0" anchor="ctr"/>
+          <a:lstStyle/>
+          <a:p>
+            <a:pPr algn="ctr"/>
+            <a:endParaRPr lang="en-US">
+              <a:solidFill>
+                <a:prstClr val="white"/>
+              </a:solidFill>
+              <a:latin typeface="Calibri" panose="020F0502020204030204"/>
+            </a:endParaRPr>
+          </a:p>
+        </p:txBody>
+      </p:sp>
+      <p:sp>
+        <p:nvSpPr>
+          <p:cNvPr id="3" name="Zástupný obsah 2">
+            <a:extLst>
+              <a:ext uri="{FF2B5EF4-FFF2-40B4-BE49-F238E27FC236}">
+                <a16:creationId xmlns:a16="http://schemas.microsoft.com/office/drawing/2014/main" id="{582472B6-7558-3B1A-A38B-6C69389ABBD9}"/>
+              </a:ext>
+            </a:extLst>
+          </p:cNvPr>
+          <p:cNvSpPr>
+            <a:spLocks noGrp="1"/>
+          </p:cNvSpPr>
+          <p:nvPr>
+            <p:ph idx="1"/>
+          </p:nvPr>
+        </p:nvSpPr>
+        <p:spPr>
+          <a:xfrm>
+            <a:off x="841248" y="3337269"/>
+            <a:ext cx="10509504" cy="2905686"/>
+          </a:xfrm>
+        </p:spPr>
+        <p:txBody>
+          <a:bodyPr>
+            <a:normAutofit/>
+          </a:bodyPr>
+          <a:lstStyle/>
+          <a:p>
+            <a:r>
+              <a:rPr lang="cs-CZ" sz="2000"/>
+              <a:t>Hugginface arena</a:t>
+            </a:r>
+          </a:p>
+          <a:p>
+            <a:pPr lvl="1"/>
+            <a:r>
+              <a:rPr lang="en-US" sz="2000">
+                <a:hlinkClick r:id="rId2"/>
+              </a:rPr>
+              <a:t>Chatbot Arena (formerly LMSYS): Free AI Chat to Compare &amp; Test Best AI Chatbots (lmarena.ai)</a:t>
+            </a:r>
+            <a:endParaRPr lang="cs-CZ" sz="2000"/>
+          </a:p>
+          <a:p>
+            <a:pPr lvl="1"/>
+            <a:r>
+              <a:rPr lang="cs-CZ" sz="2000"/>
+              <a:t>Žebříček - </a:t>
+            </a:r>
+            <a:r>
+              <a:rPr lang="en-US" sz="2000">
+                <a:hlinkClick r:id="rId3"/>
+              </a:rPr>
+              <a:t>Chatbot Arena Leaderboard - a Hugging Face Space by lmsys</a:t>
+            </a:r>
+            <a:endParaRPr lang="cs-CZ" sz="2000"/>
+          </a:p>
+          <a:p>
+            <a:r>
+              <a:rPr lang="cs-CZ" sz="2000"/>
+              <a:t>Hugginface – svět otevřených modelů</a:t>
+            </a:r>
+          </a:p>
+          <a:p>
+            <a:pPr lvl="1"/>
+            <a:r>
+              <a:rPr lang="en-US" sz="2000">
+                <a:hlinkClick r:id="rId4"/>
+              </a:rPr>
+              <a:t>Hugging Face – The AI community building the future.</a:t>
+            </a:r>
+            <a:endParaRPr lang="cs-CZ" sz="2000"/>
+          </a:p>
+          <a:p>
+            <a:r>
+              <a:rPr lang="cs-CZ" sz="2000"/>
+              <a:t>Multiagentní systémy – automatizace komplexních procesů</a:t>
+            </a:r>
+          </a:p>
+          <a:p>
+            <a:pPr lvl="1"/>
+            <a:r>
+              <a:rPr lang="cs-CZ" sz="2000">
+                <a:hlinkClick r:id="rId5"/>
+              </a:rPr>
+              <a:t>LangGraph (langchain.com)</a:t>
+            </a:r>
+            <a:endParaRPr lang="cs-CZ" sz="2000"/>
+          </a:p>
+        </p:txBody>
+      </p:sp>
+    </p:spTree>
+    <p:extLst>
+      <p:ext uri="{BB962C8B-B14F-4D97-AF65-F5344CB8AC3E}">
+        <p14:creationId xmlns:p14="http://schemas.microsoft.com/office/powerpoint/2010/main" val="1021013197"/>
+      </p:ext>
+    </p:extLst>
+  </p:cSld>
+  <p:clrMapOvr>
+    <a:masterClrMapping/>
+  </p:clrMapOvr>
+</p:sld>
+</file>
+
+<file path=ppt/slides/slide21.xml><?xml version="1.0" encoding="utf-8"?>
+<p:sld xmlns:a="http://schemas.openxmlformats.org/drawingml/2006/main" xmlns:r="http://schemas.openxmlformats.org/officeDocument/2006/relationships" xmlns:p="http://schemas.openxmlformats.org/presentationml/2006/main">
+  <p:cSld>
+    <p:bg>
+      <p:bgPr>
+        <a:solidFill>
+          <a:schemeClr val="bg1"/>
+        </a:solidFill>
+        <a:effectLst/>
+      </p:bgPr>
+    </p:bg>
+    <p:spTree>
+      <p:nvGrpSpPr>
+        <p:cNvPr id="1" name=""/>
+        <p:cNvGrpSpPr/>
+        <p:nvPr/>
+      </p:nvGrpSpPr>
+      <p:grpSpPr>
+        <a:xfrm>
+          <a:off x="0" y="0"/>
+          <a:ext cx="0" cy="0"/>
+          <a:chOff x="0" y="0"/>
+          <a:chExt cx="0" cy="0"/>
+        </a:xfrm>
+      </p:grpSpPr>
+      <p:sp useBgFill="1">
+        <p:nvSpPr>
+          <p:cNvPr id="8" name="Rectangle 7">
+            <a:extLst>
+              <a:ext uri="{FF2B5EF4-FFF2-40B4-BE49-F238E27FC236}">
+                <a16:creationId xmlns:a16="http://schemas.microsoft.com/office/drawing/2014/main" id="{943CAA20-3569-4189-9E48-239A229A86CA}"/>
+              </a:ext>
+              <a:ext uri="{C183D7F6-B498-43B3-948B-1728B52AA6E4}">
+                <adec:decorative xmlns:adec="http://schemas.microsoft.com/office/drawing/2017/decorative" val="1"/>
+              </a:ext>
+            </a:extLst>
+          </p:cNvPr>
+          <p:cNvSpPr>
+            <a:spLocks noGrp="1" noRot="1" noChangeAspect="1" noMove="1" noResize="1" noEditPoints="1" noAdjustHandles="1" noChangeArrowheads="1" noChangeShapeType="1" noTextEdit="1"/>
+          </p:cNvSpPr>
+          <p:nvPr>
+            <p:extLst>
+              <p:ext uri="{386F3935-93C4-4BCD-93E2-E3B085C9AB24}">
+                <p16:designElem xmlns:p16="http://schemas.microsoft.com/office/powerpoint/2015/main" val="1"/>
+              </p:ext>
+            </p:extLst>
+          </p:nvPr>
+        </p:nvSpPr>
+        <p:spPr>
+          <a:xfrm>
+            <a:off x="0" y="0"/>
+            <a:ext cx="12188952" cy="6858000"/>
+          </a:xfrm>
+          <a:prstGeom prst="rect">
+            <a:avLst/>
+          </a:prstGeom>
+          <a:ln>
+            <a:noFill/>
+          </a:ln>
+        </p:spPr>
+        <p:style>
+          <a:lnRef idx="2">
+            <a:schemeClr val="accent1">
+              <a:shade val="50000"/>
+            </a:schemeClr>
+          </a:lnRef>
+          <a:fillRef idx="1">
+            <a:schemeClr val="accent1"/>
+          </a:fillRef>
+          <a:effectRef idx="0">
+            <a:schemeClr val="accent1"/>
+          </a:effectRef>
+          <a:fontRef idx="minor">
+            <a:schemeClr val="lt1"/>
+          </a:fontRef>
+        </p:style>
+        <p:txBody>
+          <a:bodyPr rtlCol="0" anchor="ctr"/>
+          <a:lstStyle/>
+          <a:p>
+            <a:pPr algn="ctr"/>
+            <a:endParaRPr lang="en-US"/>
+          </a:p>
+        </p:txBody>
+      </p:sp>
+      <p:sp>
+        <p:nvSpPr>
+          <p:cNvPr id="2" name="Nadpis 1">
+            <a:extLst>
+              <a:ext uri="{FF2B5EF4-FFF2-40B4-BE49-F238E27FC236}">
+                <a16:creationId xmlns:a16="http://schemas.microsoft.com/office/drawing/2014/main" id="{B788061E-437A-59B2-D5E7-6AC941DE299A}"/>
+              </a:ext>
+            </a:extLst>
+          </p:cNvPr>
+          <p:cNvSpPr>
+            <a:spLocks noGrp="1"/>
+          </p:cNvSpPr>
+          <p:nvPr>
+            <p:ph type="title"/>
+          </p:nvPr>
+        </p:nvSpPr>
+        <p:spPr>
+          <a:xfrm>
+            <a:off x="838200" y="451381"/>
+            <a:ext cx="10512552" cy="4066540"/>
+          </a:xfrm>
+        </p:spPr>
+        <p:txBody>
+          <a:bodyPr vert="horz" lIns="91440" tIns="45720" rIns="91440" bIns="45720" rtlCol="0" anchor="b">
+            <a:normAutofit/>
+          </a:bodyPr>
+          <a:lstStyle/>
+          <a:p>
+            <a:r>
+              <a:rPr lang="cs-CZ" sz="6600" kern="1200" dirty="0">
+                <a:solidFill>
+                  <a:schemeClr val="tx1"/>
+                </a:solidFill>
+                <a:latin typeface="+mj-lt"/>
+                <a:ea typeface="+mj-ea"/>
+                <a:cs typeface="+mj-cs"/>
+              </a:rPr>
+              <a:t>Otázky či diskuze</a:t>
+            </a:r>
+            <a:endParaRPr lang="en-US" sz="6600" kern="1200" dirty="0">
+              <a:solidFill>
+                <a:schemeClr val="tx1"/>
+              </a:solidFill>
+              <a:latin typeface="+mj-lt"/>
+              <a:ea typeface="+mj-ea"/>
+              <a:cs typeface="+mj-cs"/>
+            </a:endParaRPr>
+          </a:p>
+        </p:txBody>
+      </p:sp>
+      <p:sp>
+        <p:nvSpPr>
+          <p:cNvPr id="3" name="Zástupný obsah 2">
+            <a:extLst>
+              <a:ext uri="{FF2B5EF4-FFF2-40B4-BE49-F238E27FC236}">
+                <a16:creationId xmlns:a16="http://schemas.microsoft.com/office/drawing/2014/main" id="{B943F876-DF9E-B4B3-86AA-E82FA2E926DF}"/>
+              </a:ext>
+            </a:extLst>
+          </p:cNvPr>
+          <p:cNvSpPr>
+            <a:spLocks noGrp="1"/>
+          </p:cNvSpPr>
+          <p:nvPr>
+            <p:ph idx="1"/>
+          </p:nvPr>
+        </p:nvSpPr>
+        <p:spPr>
+          <a:xfrm>
+            <a:off x="838199" y="4983276"/>
+            <a:ext cx="10512552" cy="1126680"/>
+          </a:xfrm>
+        </p:spPr>
+        <p:txBody>
+          <a:bodyPr vert="horz" lIns="91440" tIns="45720" rIns="91440" bIns="45720" rtlCol="0">
+            <a:normAutofit/>
+          </a:bodyPr>
+          <a:lstStyle/>
+          <a:p>
+            <a:pPr marL="0" indent="0">
+              <a:buNone/>
+            </a:pPr>
+            <a:r>
+              <a:rPr lang="en-US" sz="2400" kern="1200">
+                <a:solidFill>
+                  <a:schemeClr val="tx1"/>
+                </a:solidFill>
+                <a:latin typeface="+mn-lt"/>
+                <a:ea typeface="+mn-ea"/>
+                <a:cs typeface="+mn-cs"/>
+              </a:rPr>
+              <a:t>Díky za pozornost</a:t>
+            </a:r>
+          </a:p>
+        </p:txBody>
+      </p:sp>
+      <p:sp>
+        <p:nvSpPr>
+          <p:cNvPr id="10" name="sketch line">
+            <a:extLst>
+              <a:ext uri="{FF2B5EF4-FFF2-40B4-BE49-F238E27FC236}">
+                <a16:creationId xmlns:a16="http://schemas.microsoft.com/office/drawing/2014/main" id="{DA542B6D-E775-4832-91DC-2D20F857813A}"/>
+              </a:ext>
+              <a:ext uri="{C183D7F6-B498-43B3-948B-1728B52AA6E4}">
+                <adec:decorative xmlns:adec="http://schemas.microsoft.com/office/drawing/2017/decorative" val="1"/>
+              </a:ext>
+            </a:extLst>
+          </p:cNvPr>
+          <p:cNvSpPr>
+            <a:spLocks noGrp="1" noRot="1" noChangeAspect="1" noMove="1" noResize="1" noEditPoints="1" noAdjustHandles="1" noChangeArrowheads="1" noChangeShapeType="1" noTextEdit="1"/>
+          </p:cNvSpPr>
+          <p:nvPr>
+            <p:extLst>
+              <p:ext uri="{386F3935-93C4-4BCD-93E2-E3B085C9AB24}">
+                <p16:designElem xmlns:p16="http://schemas.microsoft.com/office/powerpoint/2015/main" val="1"/>
+              </p:ext>
+            </p:extLst>
+          </p:nvPr>
+        </p:nvSpPr>
+        <p:spPr>
+          <a:xfrm>
+            <a:off x="838200" y="4718595"/>
+            <a:ext cx="5410200" cy="18288"/>
+          </a:xfrm>
+          <a:custGeom>
+            <a:avLst/>
+            <a:gdLst>
+              <a:gd name="connsiteX0" fmla="*/ 0 w 5410200"/>
+              <a:gd name="connsiteY0" fmla="*/ 0 h 18288"/>
+              <a:gd name="connsiteX1" fmla="*/ 568071 w 5410200"/>
+              <a:gd name="connsiteY1" fmla="*/ 0 h 18288"/>
+              <a:gd name="connsiteX2" fmla="*/ 1298448 w 5410200"/>
+              <a:gd name="connsiteY2" fmla="*/ 0 h 18288"/>
+              <a:gd name="connsiteX3" fmla="*/ 1920621 w 5410200"/>
+              <a:gd name="connsiteY3" fmla="*/ 0 h 18288"/>
+              <a:gd name="connsiteX4" fmla="*/ 2488692 w 5410200"/>
+              <a:gd name="connsiteY4" fmla="*/ 0 h 18288"/>
+              <a:gd name="connsiteX5" fmla="*/ 3219069 w 5410200"/>
+              <a:gd name="connsiteY5" fmla="*/ 0 h 18288"/>
+              <a:gd name="connsiteX6" fmla="*/ 3895344 w 5410200"/>
+              <a:gd name="connsiteY6" fmla="*/ 0 h 18288"/>
+              <a:gd name="connsiteX7" fmla="*/ 4571619 w 5410200"/>
+              <a:gd name="connsiteY7" fmla="*/ 0 h 18288"/>
+              <a:gd name="connsiteX8" fmla="*/ 5410200 w 5410200"/>
+              <a:gd name="connsiteY8" fmla="*/ 0 h 18288"/>
+              <a:gd name="connsiteX9" fmla="*/ 5410200 w 5410200"/>
+              <a:gd name="connsiteY9" fmla="*/ 18288 h 18288"/>
+              <a:gd name="connsiteX10" fmla="*/ 4842129 w 5410200"/>
+              <a:gd name="connsiteY10" fmla="*/ 18288 h 18288"/>
+              <a:gd name="connsiteX11" fmla="*/ 4328160 w 5410200"/>
+              <a:gd name="connsiteY11" fmla="*/ 18288 h 18288"/>
+              <a:gd name="connsiteX12" fmla="*/ 3597783 w 5410200"/>
+              <a:gd name="connsiteY12" fmla="*/ 18288 h 18288"/>
+              <a:gd name="connsiteX13" fmla="*/ 3029712 w 5410200"/>
+              <a:gd name="connsiteY13" fmla="*/ 18288 h 18288"/>
+              <a:gd name="connsiteX14" fmla="*/ 2299335 w 5410200"/>
+              <a:gd name="connsiteY14" fmla="*/ 18288 h 18288"/>
+              <a:gd name="connsiteX15" fmla="*/ 1514856 w 5410200"/>
+              <a:gd name="connsiteY15" fmla="*/ 18288 h 18288"/>
+              <a:gd name="connsiteX16" fmla="*/ 892683 w 5410200"/>
+              <a:gd name="connsiteY16" fmla="*/ 18288 h 18288"/>
+              <a:gd name="connsiteX17" fmla="*/ 0 w 5410200"/>
+              <a:gd name="connsiteY17" fmla="*/ 18288 h 18288"/>
+              <a:gd name="connsiteX18" fmla="*/ 0 w 5410200"/>
+              <a:gd name="connsiteY18" fmla="*/ 0 h 18288"/>
+            </a:gdLst>
+            <a:ahLst/>
+            <a:cxnLst>
+              <a:cxn ang="0">
+                <a:pos x="connsiteX0" y="connsiteY0"/>
+              </a:cxn>
+              <a:cxn ang="0">
+                <a:pos x="connsiteX1" y="connsiteY1"/>
+              </a:cxn>
+              <a:cxn ang="0">
+                <a:pos x="connsiteX2" y="connsiteY2"/>
+              </a:cxn>
+              <a:cxn ang="0">
+                <a:pos x="connsiteX3" y="connsiteY3"/>
+              </a:cxn>
+              <a:cxn ang="0">
+                <a:pos x="connsiteX4" y="connsiteY4"/>
+              </a:cxn>
+              <a:cxn ang="0">
+                <a:pos x="connsiteX5" y="connsiteY5"/>
+              </a:cxn>
+              <a:cxn ang="0">
+                <a:pos x="connsiteX6" y="connsiteY6"/>
+              </a:cxn>
+              <a:cxn ang="0">
+                <a:pos x="connsiteX7" y="connsiteY7"/>
+              </a:cxn>
+              <a:cxn ang="0">
+                <a:pos x="connsiteX8" y="connsiteY8"/>
+              </a:cxn>
+              <a:cxn ang="0">
+                <a:pos x="connsiteX9" y="connsiteY9"/>
+              </a:cxn>
+              <a:cxn ang="0">
+                <a:pos x="connsiteX10" y="connsiteY10"/>
+              </a:cxn>
+              <a:cxn ang="0">
+                <a:pos x="connsiteX11" y="connsiteY11"/>
+              </a:cxn>
+              <a:cxn ang="0">
+                <a:pos x="connsiteX12" y="connsiteY12"/>
+              </a:cxn>
+              <a:cxn ang="0">
+                <a:pos x="connsiteX13" y="connsiteY13"/>
+              </a:cxn>
+              <a:cxn ang="0">
+                <a:pos x="connsiteX14" y="connsiteY14"/>
+              </a:cxn>
+              <a:cxn ang="0">
+                <a:pos x="connsiteX15" y="connsiteY15"/>
+              </a:cxn>
+              <a:cxn ang="0">
+                <a:pos x="connsiteX16" y="connsiteY16"/>
+              </a:cxn>
+              <a:cxn ang="0">
+                <a:pos x="connsiteX17" y="connsiteY17"/>
+              </a:cxn>
+              <a:cxn ang="0">
+                <a:pos x="connsiteX18" y="connsiteY18"/>
+              </a:cxn>
+            </a:cxnLst>
+            <a:rect l="l" t="t" r="r" b="b"/>
+            <a:pathLst>
+              <a:path w="5410200" h="18288" fill="none" extrusionOk="0">
+                <a:moveTo>
+                  <a:pt x="0" y="0"/>
+                </a:moveTo>
+                <a:cubicBezTo>
+                  <a:pt x="163050" y="-18707"/>
+                  <a:pt x="319321" y="-16364"/>
+                  <a:pt x="568071" y="0"/>
+                </a:cubicBezTo>
+                <a:cubicBezTo>
+                  <a:pt x="816821" y="16364"/>
+                  <a:pt x="1013224" y="-7268"/>
+                  <a:pt x="1298448" y="0"/>
+                </a:cubicBezTo>
+                <a:cubicBezTo>
+                  <a:pt x="1583672" y="7268"/>
+                  <a:pt x="1631711" y="-3367"/>
+                  <a:pt x="1920621" y="0"/>
+                </a:cubicBezTo>
+                <a:cubicBezTo>
+                  <a:pt x="2209531" y="3367"/>
+                  <a:pt x="2364420" y="-19184"/>
+                  <a:pt x="2488692" y="0"/>
+                </a:cubicBezTo>
+                <a:cubicBezTo>
+                  <a:pt x="2612964" y="19184"/>
+                  <a:pt x="3023298" y="-34627"/>
+                  <a:pt x="3219069" y="0"/>
+                </a:cubicBezTo>
+                <a:cubicBezTo>
+                  <a:pt x="3414840" y="34627"/>
+                  <a:pt x="3656810" y="24043"/>
+                  <a:pt x="3895344" y="0"/>
+                </a:cubicBezTo>
+                <a:cubicBezTo>
+                  <a:pt x="4133879" y="-24043"/>
+                  <a:pt x="4393984" y="-19577"/>
+                  <a:pt x="4571619" y="0"/>
+                </a:cubicBezTo>
+                <a:cubicBezTo>
+                  <a:pt x="4749255" y="19577"/>
+                  <a:pt x="5179928" y="-6281"/>
+                  <a:pt x="5410200" y="0"/>
+                </a:cubicBezTo>
+                <a:cubicBezTo>
+                  <a:pt x="5410730" y="6954"/>
+                  <a:pt x="5410934" y="12839"/>
+                  <a:pt x="5410200" y="18288"/>
+                </a:cubicBezTo>
+                <a:cubicBezTo>
+                  <a:pt x="5139060" y="6751"/>
+                  <a:pt x="5121593" y="31035"/>
+                  <a:pt x="4842129" y="18288"/>
+                </a:cubicBezTo>
+                <a:cubicBezTo>
+                  <a:pt x="4562665" y="5541"/>
+                  <a:pt x="4448273" y="9487"/>
+                  <a:pt x="4328160" y="18288"/>
+                </a:cubicBezTo>
+                <a:cubicBezTo>
+                  <a:pt x="4208047" y="27089"/>
+                  <a:pt x="3760936" y="22567"/>
+                  <a:pt x="3597783" y="18288"/>
+                </a:cubicBezTo>
+                <a:cubicBezTo>
+                  <a:pt x="3434630" y="14009"/>
+                  <a:pt x="3299718" y="33213"/>
+                  <a:pt x="3029712" y="18288"/>
+                </a:cubicBezTo>
+                <a:cubicBezTo>
+                  <a:pt x="2759706" y="3363"/>
+                  <a:pt x="2640159" y="27394"/>
+                  <a:pt x="2299335" y="18288"/>
+                </a:cubicBezTo>
+                <a:cubicBezTo>
+                  <a:pt x="1958511" y="9182"/>
+                  <a:pt x="1801186" y="28985"/>
+                  <a:pt x="1514856" y="18288"/>
+                </a:cubicBezTo>
+                <a:cubicBezTo>
+                  <a:pt x="1228526" y="7591"/>
+                  <a:pt x="1063509" y="-5305"/>
+                  <a:pt x="892683" y="18288"/>
+                </a:cubicBezTo>
+                <a:cubicBezTo>
+                  <a:pt x="721857" y="41881"/>
+                  <a:pt x="186945" y="-20897"/>
+                  <a:pt x="0" y="18288"/>
+                </a:cubicBezTo>
+                <a:cubicBezTo>
+                  <a:pt x="-570" y="9279"/>
+                  <a:pt x="132" y="5100"/>
+                  <a:pt x="0" y="0"/>
+                </a:cubicBezTo>
+                <a:close/>
+              </a:path>
+              <a:path w="5410200" h="18288" stroke="0" extrusionOk="0">
+                <a:moveTo>
+                  <a:pt x="0" y="0"/>
+                </a:moveTo>
+                <a:cubicBezTo>
+                  <a:pt x="285096" y="-4925"/>
+                  <a:pt x="376456" y="22268"/>
+                  <a:pt x="622173" y="0"/>
+                </a:cubicBezTo>
+                <a:cubicBezTo>
+                  <a:pt x="867890" y="-22268"/>
+                  <a:pt x="1031392" y="7228"/>
+                  <a:pt x="1136142" y="0"/>
+                </a:cubicBezTo>
+                <a:cubicBezTo>
+                  <a:pt x="1240892" y="-7228"/>
+                  <a:pt x="1561853" y="9877"/>
+                  <a:pt x="1920621" y="0"/>
+                </a:cubicBezTo>
+                <a:cubicBezTo>
+                  <a:pt x="2279389" y="-9877"/>
+                  <a:pt x="2367255" y="19546"/>
+                  <a:pt x="2542794" y="0"/>
+                </a:cubicBezTo>
+                <a:cubicBezTo>
+                  <a:pt x="2718333" y="-19546"/>
+                  <a:pt x="2866732" y="-22226"/>
+                  <a:pt x="3164967" y="0"/>
+                </a:cubicBezTo>
+                <a:cubicBezTo>
+                  <a:pt x="3463202" y="22226"/>
+                  <a:pt x="3568055" y="-2765"/>
+                  <a:pt x="3949446" y="0"/>
+                </a:cubicBezTo>
+                <a:cubicBezTo>
+                  <a:pt x="4330837" y="2765"/>
+                  <a:pt x="4287895" y="10557"/>
+                  <a:pt x="4517517" y="0"/>
+                </a:cubicBezTo>
+                <a:cubicBezTo>
+                  <a:pt x="4747139" y="-10557"/>
+                  <a:pt x="5149588" y="8716"/>
+                  <a:pt x="5410200" y="0"/>
+                </a:cubicBezTo>
+                <a:cubicBezTo>
+                  <a:pt x="5409517" y="5414"/>
+                  <a:pt x="5409480" y="12510"/>
+                  <a:pt x="5410200" y="18288"/>
+                </a:cubicBezTo>
+                <a:cubicBezTo>
+                  <a:pt x="5163327" y="41494"/>
+                  <a:pt x="5008749" y="10693"/>
+                  <a:pt x="4842129" y="18288"/>
+                </a:cubicBezTo>
+                <a:cubicBezTo>
+                  <a:pt x="4675509" y="25883"/>
+                  <a:pt x="4433401" y="-615"/>
+                  <a:pt x="4165854" y="18288"/>
+                </a:cubicBezTo>
+                <a:cubicBezTo>
+                  <a:pt x="3898308" y="37191"/>
+                  <a:pt x="3809032" y="-8710"/>
+                  <a:pt x="3543681" y="18288"/>
+                </a:cubicBezTo>
+                <a:cubicBezTo>
+                  <a:pt x="3278330" y="45286"/>
+                  <a:pt x="3073876" y="-15917"/>
+                  <a:pt x="2759202" y="18288"/>
+                </a:cubicBezTo>
+                <a:cubicBezTo>
+                  <a:pt x="2444528" y="52493"/>
+                  <a:pt x="2204144" y="3372"/>
+                  <a:pt x="1974723" y="18288"/>
+                </a:cubicBezTo>
+                <a:cubicBezTo>
+                  <a:pt x="1745302" y="33204"/>
+                  <a:pt x="1602335" y="31490"/>
+                  <a:pt x="1406652" y="18288"/>
+                </a:cubicBezTo>
+                <a:cubicBezTo>
+                  <a:pt x="1210969" y="5086"/>
+                  <a:pt x="923948" y="3161"/>
+                  <a:pt x="730377" y="18288"/>
+                </a:cubicBezTo>
+                <a:cubicBezTo>
+                  <a:pt x="536806" y="33415"/>
+                  <a:pt x="336496" y="-141"/>
+                  <a:pt x="0" y="18288"/>
+                </a:cubicBezTo>
+                <a:cubicBezTo>
+                  <a:pt x="-306" y="11061"/>
+                  <a:pt x="-655" y="7751"/>
+                  <a:pt x="0" y="0"/>
+                </a:cubicBezTo>
+                <a:close/>
+              </a:path>
+            </a:pathLst>
+          </a:custGeom>
+          <a:solidFill>
+            <a:schemeClr val="accent2"/>
+          </a:solidFill>
+          <a:ln w="41275" cap="rnd">
+            <a:solidFill>
+              <a:schemeClr val="accent2"/>
+            </a:solidFill>
+            <a:round/>
+            <a:extLst>
+              <a:ext uri="{C807C97D-BFC1-408E-A445-0C87EB9F89A2}">
+                <ask:lineSketchStyleProps xmlns:ask="http://schemas.microsoft.com/office/drawing/2018/sketchyshapes" sd="1219033472">
+                  <a:prstGeom prst="rect">
+                    <a:avLst/>
+                  </a:prstGeom>
+                  <ask:type>
+                    <ask:lineSketchFreehand/>
+                  </ask:type>
+                </ask:lineSketchStyleProps>
+              </a:ext>
+            </a:extLst>
+          </a:ln>
+        </p:spPr>
+        <p:style>
+          <a:lnRef idx="2">
+            <a:schemeClr val="accent1">
+              <a:shade val="50000"/>
+            </a:schemeClr>
+          </a:lnRef>
+          <a:fillRef idx="1">
+            <a:schemeClr val="accent1"/>
+          </a:fillRef>
+          <a:effectRef idx="0">
+            <a:schemeClr val="accent1"/>
+          </a:effectRef>
+          <a:fontRef idx="minor">
+            <a:schemeClr val="lt1"/>
+          </a:fontRef>
+        </p:style>
+        <p:txBody>
+          <a:bodyPr rtlCol="0" anchor="ctr"/>
+          <a:lstStyle/>
+          <a:p>
+            <a:pPr algn="ctr"/>
+            <a:endParaRPr lang="en-US"/>
+          </a:p>
+        </p:txBody>
+      </p:sp>
+    </p:spTree>
+    <p:extLst>
+      <p:ext uri="{BB962C8B-B14F-4D97-AF65-F5344CB8AC3E}">
+        <p14:creationId xmlns:p14="http://schemas.microsoft.com/office/powerpoint/2010/main" val="1380641108"/>
+      </p:ext>
+    </p:extLst>
+  </p:cSld>
+  <p:clrMapOvr>
+    <a:masterClrMapping/>
+  </p:clrMapOvr>
 </p:sld>
 </file>
 

</xml_diff>